<commit_message>
As presented on 6/23/2016.
</commit_message>
<xml_diff>
--- a/Gradle and Eclipse RCP.pptx
+++ b/Gradle and Eclipse RCP.pptx
@@ -261,7 +261,7 @@
           <a:p>
             <a:fld id="{B8966210-D7C8-4A1C-B59E-033C29288170}" type="datetimeFigureOut">
               <a:rPr lang="en-US" smtClean="0"/>
-              <a:t>6/20/2016</a:t>
+              <a:t>6/23/2016</a:t>
             </a:fld>
             <a:endParaRPr lang="en-US"/>
           </a:p>
@@ -431,7 +431,7 @@
           <a:p>
             <a:fld id="{B8966210-D7C8-4A1C-B59E-033C29288170}" type="datetimeFigureOut">
               <a:rPr lang="en-US" smtClean="0"/>
-              <a:t>6/20/2016</a:t>
+              <a:t>6/23/2016</a:t>
             </a:fld>
             <a:endParaRPr lang="en-US"/>
           </a:p>
@@ -611,7 +611,7 @@
           <a:p>
             <a:fld id="{B8966210-D7C8-4A1C-B59E-033C29288170}" type="datetimeFigureOut">
               <a:rPr lang="en-US" smtClean="0"/>
-              <a:t>6/20/2016</a:t>
+              <a:t>6/23/2016</a:t>
             </a:fld>
             <a:endParaRPr lang="en-US"/>
           </a:p>
@@ -2029,7 +2029,7 @@
           <a:p>
             <a:fld id="{B8966210-D7C8-4A1C-B59E-033C29288170}" type="datetimeFigureOut">
               <a:rPr lang="en-US" smtClean="0"/>
-              <a:t>6/20/2016</a:t>
+              <a:t>6/23/2016</a:t>
             </a:fld>
             <a:endParaRPr lang="en-US"/>
           </a:p>
@@ -2861,7 +2861,7 @@
           <a:p>
             <a:fld id="{B8966210-D7C8-4A1C-B59E-033C29288170}" type="datetimeFigureOut">
               <a:rPr lang="en-US" smtClean="0"/>
-              <a:t>6/20/2016</a:t>
+              <a:t>6/23/2016</a:t>
             </a:fld>
             <a:endParaRPr lang="en-US"/>
           </a:p>
@@ -3093,7 +3093,7 @@
           <a:p>
             <a:fld id="{B8966210-D7C8-4A1C-B59E-033C29288170}" type="datetimeFigureOut">
               <a:rPr lang="en-US" smtClean="0"/>
-              <a:t>6/20/2016</a:t>
+              <a:t>6/23/2016</a:t>
             </a:fld>
             <a:endParaRPr lang="en-US"/>
           </a:p>
@@ -3460,7 +3460,7 @@
           <a:p>
             <a:fld id="{B8966210-D7C8-4A1C-B59E-033C29288170}" type="datetimeFigureOut">
               <a:rPr lang="en-US" smtClean="0"/>
-              <a:t>6/20/2016</a:t>
+              <a:t>6/23/2016</a:t>
             </a:fld>
             <a:endParaRPr lang="en-US"/>
           </a:p>
@@ -3578,7 +3578,7 @@
           <a:p>
             <a:fld id="{B8966210-D7C8-4A1C-B59E-033C29288170}" type="datetimeFigureOut">
               <a:rPr lang="en-US" smtClean="0"/>
-              <a:t>6/20/2016</a:t>
+              <a:t>6/23/2016</a:t>
             </a:fld>
             <a:endParaRPr lang="en-US"/>
           </a:p>
@@ -3673,7 +3673,7 @@
           <a:p>
             <a:fld id="{B8966210-D7C8-4A1C-B59E-033C29288170}" type="datetimeFigureOut">
               <a:rPr lang="en-US" smtClean="0"/>
-              <a:t>6/20/2016</a:t>
+              <a:t>6/23/2016</a:t>
             </a:fld>
             <a:endParaRPr lang="en-US"/>
           </a:p>
@@ -3950,7 +3950,7 @@
           <a:p>
             <a:fld id="{B8966210-D7C8-4A1C-B59E-033C29288170}" type="datetimeFigureOut">
               <a:rPr lang="en-US" smtClean="0"/>
-              <a:t>6/20/2016</a:t>
+              <a:t>6/23/2016</a:t>
             </a:fld>
             <a:endParaRPr lang="en-US"/>
           </a:p>
@@ -4207,7 +4207,7 @@
           <a:p>
             <a:fld id="{B8966210-D7C8-4A1C-B59E-033C29288170}" type="datetimeFigureOut">
               <a:rPr lang="en-US" smtClean="0"/>
-              <a:t>6/20/2016</a:t>
+              <a:t>6/23/2016</a:t>
             </a:fld>
             <a:endParaRPr lang="en-US"/>
           </a:p>
@@ -4420,7 +4420,7 @@
           <a:p>
             <a:fld id="{B8966210-D7C8-4A1C-B59E-033C29288170}" type="datetimeFigureOut">
               <a:rPr lang="en-US" smtClean="0"/>
-              <a:t>6/20/2016</a:t>
+              <a:t>6/23/2016</a:t>
             </a:fld>
             <a:endParaRPr lang="en-US"/>
           </a:p>
@@ -4856,7 +4856,7 @@
           </a:ln>
           <a:extLst>
             <a:ext uri="{C572A759-6A51-4108-AA02-DFA0A04FC94B}">
-              <ma14:wrappingTextBoxFlag xmlns="" xmlns:ma14="http://schemas.microsoft.com/office/mac/drawingml/2011/main" val="1"/>
+              <ma14:wrappingTextBoxFlag xmlns:ma14="http://schemas.microsoft.com/office/mac/drawingml/2011/main" xmlns="" val="1"/>
             </a:ext>
           </a:extLst>
         </p:spPr>
@@ -4893,7 +4893,7 @@
           </a:ln>
           <a:extLst>
             <a:ext uri="{C572A759-6A51-4108-AA02-DFA0A04FC94B}">
-              <ma14:wrappingTextBoxFlag xmlns="" xmlns:ma14="http://schemas.microsoft.com/office/mac/drawingml/2011/main" val="1"/>
+              <ma14:wrappingTextBoxFlag xmlns:ma14="http://schemas.microsoft.com/office/mac/drawingml/2011/main" xmlns="" val="1"/>
             </a:ext>
           </a:extLst>
         </p:spPr>
@@ -5841,7 +5841,7 @@
           </a:ln>
           <a:extLst>
             <a:ext uri="{C572A759-6A51-4108-AA02-DFA0A04FC94B}">
-              <ma14:wrappingTextBoxFlag xmlns="" xmlns:ma14="http://schemas.microsoft.com/office/mac/drawingml/2011/main" val="1"/>
+              <ma14:wrappingTextBoxFlag xmlns:ma14="http://schemas.microsoft.com/office/mac/drawingml/2011/main" xmlns="" val="1"/>
             </a:ext>
           </a:extLst>
         </p:spPr>
@@ -5878,7 +5878,7 @@
           </a:ln>
           <a:extLst>
             <a:ext uri="{C572A759-6A51-4108-AA02-DFA0A04FC94B}">
-              <ma14:wrappingTextBoxFlag xmlns="" xmlns:ma14="http://schemas.microsoft.com/office/mac/drawingml/2011/main" val="1"/>
+              <ma14:wrappingTextBoxFlag xmlns:ma14="http://schemas.microsoft.com/office/mac/drawingml/2011/main" xmlns="" val="1"/>
             </a:ext>
           </a:extLst>
         </p:spPr>
@@ -6989,7 +6989,7 @@
           </a:ln>
           <a:extLst>
             <a:ext uri="{C572A759-6A51-4108-AA02-DFA0A04FC94B}">
-              <ma14:wrappingTextBoxFlag xmlns="" xmlns:ma14="http://schemas.microsoft.com/office/mac/drawingml/2011/main" val="1"/>
+              <ma14:wrappingTextBoxFlag xmlns:ma14="http://schemas.microsoft.com/office/mac/drawingml/2011/main" xmlns="" val="1"/>
             </a:ext>
           </a:extLst>
         </p:spPr>
@@ -7078,7 +7078,7 @@
           </a:ln>
           <a:extLst>
             <a:ext uri="{C572A759-6A51-4108-AA02-DFA0A04FC94B}">
-              <ma14:wrappingTextBoxFlag xmlns="" xmlns:ma14="http://schemas.microsoft.com/office/mac/drawingml/2011/main" val="1"/>
+              <ma14:wrappingTextBoxFlag xmlns:ma14="http://schemas.microsoft.com/office/mac/drawingml/2011/main" xmlns="" val="1"/>
             </a:ext>
           </a:extLst>
         </p:spPr>
@@ -7778,15 +7778,7 @@
             </a:r>
             <a:r>
               <a:rPr lang="en-US" dirty="0" smtClean="0"/>
-              <a:t>onsume </a:t>
-            </a:r>
-            <a:r>
-              <a:rPr lang="en-US" dirty="0" smtClean="0"/>
-              <a:t>deps from </a:t>
-            </a:r>
-            <a:r>
-              <a:rPr lang="en-US" dirty="0" smtClean="0"/>
-              <a:t>p2</a:t>
+              <a:t>onsume deps from p2</a:t>
             </a:r>
             <a:endParaRPr lang="en-US" dirty="0"/>
           </a:p>
@@ -8193,15 +8185,7 @@
                   <a:srgbClr val="0070C0"/>
                 </a:solidFill>
               </a:rPr>
-              <a:t>Recommende</a:t>
-            </a:r>
-            <a:r>
-              <a:rPr lang="en-US" dirty="0" smtClean="0">
-                <a:solidFill>
-                  <a:srgbClr val="0070C0"/>
-                </a:solidFill>
-              </a:rPr>
-              <a:t>d: </a:t>
+              <a:t>Recommended: </a:t>
             </a:r>
             <a:r>
               <a:rPr lang="en-US" dirty="0" err="1" smtClean="0">
@@ -8256,7 +8240,6 @@
               <a:rPr lang="en-US" dirty="0" smtClean="0"/>
               <a:t>Doesn’t encode any dependency information into the maven repo it creates.</a:t>
             </a:r>
-            <a:endParaRPr lang="en-US" dirty="0" smtClean="0"/>
           </a:p>
         </p:txBody>
       </p:sp>
@@ -11366,7 +11349,590 @@
   <p:timing>
     <p:tnLst>
       <p:par>
-        <p:cTn id="1" dur="indefinite" restart="never" nodeType="tmRoot"/>
+        <p:cTn id="1" dur="indefinite" restart="never" nodeType="tmRoot">
+          <p:childTnLst>
+            <p:seq concurrent="1" nextAc="seek">
+              <p:cTn id="2" dur="indefinite" nodeType="mainSeq">
+                <p:childTnLst>
+                  <p:par>
+                    <p:cTn id="3" fill="hold">
+                      <p:stCondLst>
+                        <p:cond delay="indefinite"/>
+                      </p:stCondLst>
+                      <p:childTnLst>
+                        <p:par>
+                          <p:cTn id="4" fill="hold">
+                            <p:stCondLst>
+                              <p:cond delay="0"/>
+                            </p:stCondLst>
+                            <p:childTnLst>
+                              <p:par>
+                                <p:cTn id="5" presetID="1" presetClass="entr" presetSubtype="0" fill="hold" nodeType="clickEffect">
+                                  <p:stCondLst>
+                                    <p:cond delay="0"/>
+                                  </p:stCondLst>
+                                  <p:childTnLst>
+                                    <p:set>
+                                      <p:cBhvr>
+                                        <p:cTn id="6" dur="1" fill="hold">
+                                          <p:stCondLst>
+                                            <p:cond delay="0"/>
+                                          </p:stCondLst>
+                                        </p:cTn>
+                                        <p:tgtEl>
+                                          <p:spTgt spid="6">
+                                            <p:txEl>
+                                              <p:pRg st="0" end="0"/>
+                                            </p:txEl>
+                                          </p:spTgt>
+                                        </p:tgtEl>
+                                        <p:attrNameLst>
+                                          <p:attrName>style.visibility</p:attrName>
+                                        </p:attrNameLst>
+                                      </p:cBhvr>
+                                      <p:to>
+                                        <p:strVal val="visible"/>
+                                      </p:to>
+                                    </p:set>
+                                  </p:childTnLst>
+                                </p:cTn>
+                              </p:par>
+                              <p:par>
+                                <p:cTn id="7" presetID="1" presetClass="entr" presetSubtype="0" fill="hold" nodeType="withEffect">
+                                  <p:stCondLst>
+                                    <p:cond delay="0"/>
+                                  </p:stCondLst>
+                                  <p:childTnLst>
+                                    <p:set>
+                                      <p:cBhvr>
+                                        <p:cTn id="8" dur="1" fill="hold">
+                                          <p:stCondLst>
+                                            <p:cond delay="0"/>
+                                          </p:stCondLst>
+                                        </p:cTn>
+                                        <p:tgtEl>
+                                          <p:spTgt spid="6">
+                                            <p:txEl>
+                                              <p:pRg st="1" end="1"/>
+                                            </p:txEl>
+                                          </p:spTgt>
+                                        </p:tgtEl>
+                                        <p:attrNameLst>
+                                          <p:attrName>style.visibility</p:attrName>
+                                        </p:attrNameLst>
+                                      </p:cBhvr>
+                                      <p:to>
+                                        <p:strVal val="visible"/>
+                                      </p:to>
+                                    </p:set>
+                                  </p:childTnLst>
+                                </p:cTn>
+                              </p:par>
+                            </p:childTnLst>
+                          </p:cTn>
+                        </p:par>
+                      </p:childTnLst>
+                    </p:cTn>
+                  </p:par>
+                  <p:par>
+                    <p:cTn id="9" fill="hold">
+                      <p:stCondLst>
+                        <p:cond delay="indefinite"/>
+                      </p:stCondLst>
+                      <p:childTnLst>
+                        <p:par>
+                          <p:cTn id="10" fill="hold">
+                            <p:stCondLst>
+                              <p:cond delay="0"/>
+                            </p:stCondLst>
+                            <p:childTnLst>
+                              <p:par>
+                                <p:cTn id="11" presetID="1" presetClass="entr" presetSubtype="0" fill="hold" nodeType="clickEffect">
+                                  <p:stCondLst>
+                                    <p:cond delay="0"/>
+                                  </p:stCondLst>
+                                  <p:childTnLst>
+                                    <p:set>
+                                      <p:cBhvr>
+                                        <p:cTn id="12" dur="1" fill="hold">
+                                          <p:stCondLst>
+                                            <p:cond delay="0"/>
+                                          </p:stCondLst>
+                                        </p:cTn>
+                                        <p:tgtEl>
+                                          <p:spTgt spid="6">
+                                            <p:txEl>
+                                              <p:pRg st="2" end="2"/>
+                                            </p:txEl>
+                                          </p:spTgt>
+                                        </p:tgtEl>
+                                        <p:attrNameLst>
+                                          <p:attrName>style.visibility</p:attrName>
+                                        </p:attrNameLst>
+                                      </p:cBhvr>
+                                      <p:to>
+                                        <p:strVal val="visible"/>
+                                      </p:to>
+                                    </p:set>
+                                  </p:childTnLst>
+                                </p:cTn>
+                              </p:par>
+                              <p:par>
+                                <p:cTn id="13" presetID="1" presetClass="entr" presetSubtype="0" fill="hold" nodeType="withEffect">
+                                  <p:stCondLst>
+                                    <p:cond delay="0"/>
+                                  </p:stCondLst>
+                                  <p:childTnLst>
+                                    <p:set>
+                                      <p:cBhvr>
+                                        <p:cTn id="14" dur="1" fill="hold">
+                                          <p:stCondLst>
+                                            <p:cond delay="0"/>
+                                          </p:stCondLst>
+                                        </p:cTn>
+                                        <p:tgtEl>
+                                          <p:spTgt spid="6">
+                                            <p:txEl>
+                                              <p:pRg st="3" end="3"/>
+                                            </p:txEl>
+                                          </p:spTgt>
+                                        </p:tgtEl>
+                                        <p:attrNameLst>
+                                          <p:attrName>style.visibility</p:attrName>
+                                        </p:attrNameLst>
+                                      </p:cBhvr>
+                                      <p:to>
+                                        <p:strVal val="visible"/>
+                                      </p:to>
+                                    </p:set>
+                                  </p:childTnLst>
+                                </p:cTn>
+                              </p:par>
+                            </p:childTnLst>
+                          </p:cTn>
+                        </p:par>
+                      </p:childTnLst>
+                    </p:cTn>
+                  </p:par>
+                  <p:par>
+                    <p:cTn id="15" fill="hold">
+                      <p:stCondLst>
+                        <p:cond delay="indefinite"/>
+                      </p:stCondLst>
+                      <p:childTnLst>
+                        <p:par>
+                          <p:cTn id="16" fill="hold">
+                            <p:stCondLst>
+                              <p:cond delay="0"/>
+                            </p:stCondLst>
+                            <p:childTnLst>
+                              <p:par>
+                                <p:cTn id="17" presetID="1" presetClass="entr" presetSubtype="0" fill="hold" nodeType="clickEffect">
+                                  <p:stCondLst>
+                                    <p:cond delay="0"/>
+                                  </p:stCondLst>
+                                  <p:childTnLst>
+                                    <p:set>
+                                      <p:cBhvr>
+                                        <p:cTn id="18" dur="1" fill="hold">
+                                          <p:stCondLst>
+                                            <p:cond delay="0"/>
+                                          </p:stCondLst>
+                                        </p:cTn>
+                                        <p:tgtEl>
+                                          <p:spTgt spid="6">
+                                            <p:txEl>
+                                              <p:pRg st="4" end="4"/>
+                                            </p:txEl>
+                                          </p:spTgt>
+                                        </p:tgtEl>
+                                        <p:attrNameLst>
+                                          <p:attrName>style.visibility</p:attrName>
+                                        </p:attrNameLst>
+                                      </p:cBhvr>
+                                      <p:to>
+                                        <p:strVal val="visible"/>
+                                      </p:to>
+                                    </p:set>
+                                  </p:childTnLst>
+                                </p:cTn>
+                              </p:par>
+                              <p:par>
+                                <p:cTn id="19" presetID="1" presetClass="entr" presetSubtype="0" fill="hold" nodeType="withEffect">
+                                  <p:stCondLst>
+                                    <p:cond delay="0"/>
+                                  </p:stCondLst>
+                                  <p:childTnLst>
+                                    <p:set>
+                                      <p:cBhvr>
+                                        <p:cTn id="20" dur="1" fill="hold">
+                                          <p:stCondLst>
+                                            <p:cond delay="0"/>
+                                          </p:stCondLst>
+                                        </p:cTn>
+                                        <p:tgtEl>
+                                          <p:spTgt spid="6">
+                                            <p:txEl>
+                                              <p:pRg st="5" end="5"/>
+                                            </p:txEl>
+                                          </p:spTgt>
+                                        </p:tgtEl>
+                                        <p:attrNameLst>
+                                          <p:attrName>style.visibility</p:attrName>
+                                        </p:attrNameLst>
+                                      </p:cBhvr>
+                                      <p:to>
+                                        <p:strVal val="visible"/>
+                                      </p:to>
+                                    </p:set>
+                                  </p:childTnLst>
+                                </p:cTn>
+                              </p:par>
+                            </p:childTnLst>
+                          </p:cTn>
+                        </p:par>
+                      </p:childTnLst>
+                    </p:cTn>
+                  </p:par>
+                  <p:par>
+                    <p:cTn id="21" fill="hold">
+                      <p:stCondLst>
+                        <p:cond delay="indefinite"/>
+                      </p:stCondLst>
+                      <p:childTnLst>
+                        <p:par>
+                          <p:cTn id="22" fill="hold">
+                            <p:stCondLst>
+                              <p:cond delay="0"/>
+                            </p:stCondLst>
+                            <p:childTnLst>
+                              <p:par>
+                                <p:cTn id="23" presetID="1" presetClass="entr" presetSubtype="0" fill="hold" nodeType="clickEffect">
+                                  <p:stCondLst>
+                                    <p:cond delay="0"/>
+                                  </p:stCondLst>
+                                  <p:childTnLst>
+                                    <p:set>
+                                      <p:cBhvr>
+                                        <p:cTn id="24" dur="1" fill="hold">
+                                          <p:stCondLst>
+                                            <p:cond delay="0"/>
+                                          </p:stCondLst>
+                                        </p:cTn>
+                                        <p:tgtEl>
+                                          <p:spTgt spid="6">
+                                            <p:txEl>
+                                              <p:pRg st="6" end="6"/>
+                                            </p:txEl>
+                                          </p:spTgt>
+                                        </p:tgtEl>
+                                        <p:attrNameLst>
+                                          <p:attrName>style.visibility</p:attrName>
+                                        </p:attrNameLst>
+                                      </p:cBhvr>
+                                      <p:to>
+                                        <p:strVal val="visible"/>
+                                      </p:to>
+                                    </p:set>
+                                  </p:childTnLst>
+                                </p:cTn>
+                              </p:par>
+                              <p:par>
+                                <p:cTn id="25" presetID="1" presetClass="entr" presetSubtype="0" fill="hold" nodeType="withEffect">
+                                  <p:stCondLst>
+                                    <p:cond delay="0"/>
+                                  </p:stCondLst>
+                                  <p:childTnLst>
+                                    <p:set>
+                                      <p:cBhvr>
+                                        <p:cTn id="26" dur="1" fill="hold">
+                                          <p:stCondLst>
+                                            <p:cond delay="0"/>
+                                          </p:stCondLst>
+                                        </p:cTn>
+                                        <p:tgtEl>
+                                          <p:spTgt spid="6">
+                                            <p:txEl>
+                                              <p:pRg st="7" end="7"/>
+                                            </p:txEl>
+                                          </p:spTgt>
+                                        </p:tgtEl>
+                                        <p:attrNameLst>
+                                          <p:attrName>style.visibility</p:attrName>
+                                        </p:attrNameLst>
+                                      </p:cBhvr>
+                                      <p:to>
+                                        <p:strVal val="visible"/>
+                                      </p:to>
+                                    </p:set>
+                                  </p:childTnLst>
+                                </p:cTn>
+                              </p:par>
+                            </p:childTnLst>
+                          </p:cTn>
+                        </p:par>
+                      </p:childTnLst>
+                    </p:cTn>
+                  </p:par>
+                  <p:par>
+                    <p:cTn id="27" fill="hold">
+                      <p:stCondLst>
+                        <p:cond delay="indefinite"/>
+                      </p:stCondLst>
+                      <p:childTnLst>
+                        <p:par>
+                          <p:cTn id="28" fill="hold">
+                            <p:stCondLst>
+                              <p:cond delay="0"/>
+                            </p:stCondLst>
+                            <p:childTnLst>
+                              <p:par>
+                                <p:cTn id="29" presetID="1" presetClass="entr" presetSubtype="0" fill="hold" nodeType="clickEffect">
+                                  <p:stCondLst>
+                                    <p:cond delay="0"/>
+                                  </p:stCondLst>
+                                  <p:childTnLst>
+                                    <p:set>
+                                      <p:cBhvr>
+                                        <p:cTn id="30" dur="1" fill="hold">
+                                          <p:stCondLst>
+                                            <p:cond delay="0"/>
+                                          </p:stCondLst>
+                                        </p:cTn>
+                                        <p:tgtEl>
+                                          <p:spTgt spid="5">
+                                            <p:txEl>
+                                              <p:pRg st="8" end="8"/>
+                                            </p:txEl>
+                                          </p:spTgt>
+                                        </p:tgtEl>
+                                        <p:attrNameLst>
+                                          <p:attrName>style.visibility</p:attrName>
+                                        </p:attrNameLst>
+                                      </p:cBhvr>
+                                      <p:to>
+                                        <p:strVal val="visible"/>
+                                      </p:to>
+                                    </p:set>
+                                  </p:childTnLst>
+                                </p:cTn>
+                              </p:par>
+                              <p:par>
+                                <p:cTn id="31" presetID="1" presetClass="entr" presetSubtype="0" fill="hold" nodeType="withEffect">
+                                  <p:stCondLst>
+                                    <p:cond delay="0"/>
+                                  </p:stCondLst>
+                                  <p:childTnLst>
+                                    <p:set>
+                                      <p:cBhvr>
+                                        <p:cTn id="32" dur="1" fill="hold">
+                                          <p:stCondLst>
+                                            <p:cond delay="0"/>
+                                          </p:stCondLst>
+                                        </p:cTn>
+                                        <p:tgtEl>
+                                          <p:spTgt spid="5">
+                                            <p:txEl>
+                                              <p:pRg st="9" end="9"/>
+                                            </p:txEl>
+                                          </p:spTgt>
+                                        </p:tgtEl>
+                                        <p:attrNameLst>
+                                          <p:attrName>style.visibility</p:attrName>
+                                        </p:attrNameLst>
+                                      </p:cBhvr>
+                                      <p:to>
+                                        <p:strVal val="visible"/>
+                                      </p:to>
+                                    </p:set>
+                                  </p:childTnLst>
+                                </p:cTn>
+                              </p:par>
+                            </p:childTnLst>
+                          </p:cTn>
+                        </p:par>
+                      </p:childTnLst>
+                    </p:cTn>
+                  </p:par>
+                  <p:par>
+                    <p:cTn id="33" fill="hold">
+                      <p:stCondLst>
+                        <p:cond delay="indefinite"/>
+                      </p:stCondLst>
+                      <p:childTnLst>
+                        <p:par>
+                          <p:cTn id="34" fill="hold">
+                            <p:stCondLst>
+                              <p:cond delay="0"/>
+                            </p:stCondLst>
+                            <p:childTnLst>
+                              <p:par>
+                                <p:cTn id="35" presetID="1" presetClass="entr" presetSubtype="0" fill="hold" nodeType="clickEffect">
+                                  <p:stCondLst>
+                                    <p:cond delay="0"/>
+                                  </p:stCondLst>
+                                  <p:childTnLst>
+                                    <p:set>
+                                      <p:cBhvr>
+                                        <p:cTn id="36" dur="1" fill="hold">
+                                          <p:stCondLst>
+                                            <p:cond delay="0"/>
+                                          </p:stCondLst>
+                                        </p:cTn>
+                                        <p:tgtEl>
+                                          <p:spTgt spid="5">
+                                            <p:txEl>
+                                              <p:pRg st="10" end="10"/>
+                                            </p:txEl>
+                                          </p:spTgt>
+                                        </p:tgtEl>
+                                        <p:attrNameLst>
+                                          <p:attrName>style.visibility</p:attrName>
+                                        </p:attrNameLst>
+                                      </p:cBhvr>
+                                      <p:to>
+                                        <p:strVal val="visible"/>
+                                      </p:to>
+                                    </p:set>
+                                  </p:childTnLst>
+                                </p:cTn>
+                              </p:par>
+                              <p:par>
+                                <p:cTn id="37" presetID="1" presetClass="entr" presetSubtype="0" fill="hold" nodeType="withEffect">
+                                  <p:stCondLst>
+                                    <p:cond delay="0"/>
+                                  </p:stCondLst>
+                                  <p:childTnLst>
+                                    <p:set>
+                                      <p:cBhvr>
+                                        <p:cTn id="38" dur="1" fill="hold">
+                                          <p:stCondLst>
+                                            <p:cond delay="0"/>
+                                          </p:stCondLst>
+                                        </p:cTn>
+                                        <p:tgtEl>
+                                          <p:spTgt spid="5">
+                                            <p:txEl>
+                                              <p:pRg st="11" end="11"/>
+                                            </p:txEl>
+                                          </p:spTgt>
+                                        </p:tgtEl>
+                                        <p:attrNameLst>
+                                          <p:attrName>style.visibility</p:attrName>
+                                        </p:attrNameLst>
+                                      </p:cBhvr>
+                                      <p:to>
+                                        <p:strVal val="visible"/>
+                                      </p:to>
+                                    </p:set>
+                                  </p:childTnLst>
+                                </p:cTn>
+                              </p:par>
+                            </p:childTnLst>
+                          </p:cTn>
+                        </p:par>
+                      </p:childTnLst>
+                    </p:cTn>
+                  </p:par>
+                  <p:par>
+                    <p:cTn id="39" fill="hold">
+                      <p:stCondLst>
+                        <p:cond delay="indefinite"/>
+                      </p:stCondLst>
+                      <p:childTnLst>
+                        <p:par>
+                          <p:cTn id="40" fill="hold">
+                            <p:stCondLst>
+                              <p:cond delay="0"/>
+                            </p:stCondLst>
+                            <p:childTnLst>
+                              <p:par>
+                                <p:cTn id="41" presetID="1" presetClass="entr" presetSubtype="0" fill="hold" nodeType="clickEffect">
+                                  <p:stCondLst>
+                                    <p:cond delay="0"/>
+                                  </p:stCondLst>
+                                  <p:childTnLst>
+                                    <p:set>
+                                      <p:cBhvr>
+                                        <p:cTn id="42" dur="1" fill="hold">
+                                          <p:stCondLst>
+                                            <p:cond delay="0"/>
+                                          </p:stCondLst>
+                                        </p:cTn>
+                                        <p:tgtEl>
+                                          <p:spTgt spid="5">
+                                            <p:txEl>
+                                              <p:pRg st="12" end="12"/>
+                                            </p:txEl>
+                                          </p:spTgt>
+                                        </p:tgtEl>
+                                        <p:attrNameLst>
+                                          <p:attrName>style.visibility</p:attrName>
+                                        </p:attrNameLst>
+                                      </p:cBhvr>
+                                      <p:to>
+                                        <p:strVal val="visible"/>
+                                      </p:to>
+                                    </p:set>
+                                  </p:childTnLst>
+                                </p:cTn>
+                              </p:par>
+                              <p:par>
+                                <p:cTn id="43" presetID="1" presetClass="entr" presetSubtype="0" fill="hold" nodeType="withEffect">
+                                  <p:stCondLst>
+                                    <p:cond delay="0"/>
+                                  </p:stCondLst>
+                                  <p:childTnLst>
+                                    <p:set>
+                                      <p:cBhvr>
+                                        <p:cTn id="44" dur="1" fill="hold">
+                                          <p:stCondLst>
+                                            <p:cond delay="0"/>
+                                          </p:stCondLst>
+                                        </p:cTn>
+                                        <p:tgtEl>
+                                          <p:spTgt spid="5">
+                                            <p:txEl>
+                                              <p:pRg st="13" end="13"/>
+                                            </p:txEl>
+                                          </p:spTgt>
+                                        </p:tgtEl>
+                                        <p:attrNameLst>
+                                          <p:attrName>style.visibility</p:attrName>
+                                        </p:attrNameLst>
+                                      </p:cBhvr>
+                                      <p:to>
+                                        <p:strVal val="visible"/>
+                                      </p:to>
+                                    </p:set>
+                                  </p:childTnLst>
+                                </p:cTn>
+                              </p:par>
+                            </p:childTnLst>
+                          </p:cTn>
+                        </p:par>
+                      </p:childTnLst>
+                    </p:cTn>
+                  </p:par>
+                </p:childTnLst>
+              </p:cTn>
+              <p:prevCondLst>
+                <p:cond evt="onPrev" delay="0">
+                  <p:tgtEl>
+                    <p:sldTgt/>
+                  </p:tgtEl>
+                </p:cond>
+              </p:prevCondLst>
+              <p:nextCondLst>
+                <p:cond evt="onNext" delay="0">
+                  <p:tgtEl>
+                    <p:sldTgt/>
+                  </p:tgtEl>
+                </p:cond>
+              </p:nextCondLst>
+            </p:seq>
+          </p:childTnLst>
+        </p:cTn>
       </p:par>
     </p:tnLst>
   </p:timing>
@@ -12604,7 +13170,7 @@
           </a:ln>
           <a:extLst>
             <a:ext uri="{C572A759-6A51-4108-AA02-DFA0A04FC94B}">
-              <ma14:wrappingTextBoxFlag xmlns="" xmlns:ma14="http://schemas.microsoft.com/office/mac/drawingml/2011/main" val="1"/>
+              <ma14:wrappingTextBoxFlag xmlns:ma14="http://schemas.microsoft.com/office/mac/drawingml/2011/main" xmlns="" val="1"/>
             </a:ext>
           </a:extLst>
         </p:spPr>
@@ -13426,11 +13992,7 @@
           <a:p>
             <a:r>
               <a:rPr lang="en-US" sz="3200" dirty="0" smtClean="0"/>
-              <a:t>Why </a:t>
-            </a:r>
-            <a:r>
-              <a:rPr lang="en-US" sz="3200" dirty="0" smtClean="0"/>
-              <a:t>is p2 hard in </a:t>
+              <a:t>Why is p2 hard in </a:t>
             </a:r>
             <a:r>
               <a:rPr lang="en-US" sz="3200" dirty="0" err="1" smtClean="0"/>
@@ -13444,46 +14006,25 @@
           <a:p>
             <a:r>
               <a:rPr lang="en-US" sz="3200" dirty="0" smtClean="0"/>
-              <a:t>P2 </a:t>
-            </a:r>
+              <a:t>P2 -&gt; Maven</a:t>
+            </a:r>
+          </a:p>
+          <a:p>
             <a:r>
               <a:rPr lang="en-US" sz="3200" dirty="0" smtClean="0"/>
-              <a:t>-&gt; Maven</a:t>
+              <a:t>Maven -&gt; P2</a:t>
             </a:r>
           </a:p>
           <a:p>
             <a:r>
               <a:rPr lang="en-US" sz="3200" dirty="0" smtClean="0"/>
-              <a:t>Maven </a:t>
-            </a:r>
+              <a:t>PDE build for RCP</a:t>
+            </a:r>
+          </a:p>
+          <a:p>
             <a:r>
               <a:rPr lang="en-US" sz="3200" dirty="0" smtClean="0"/>
-              <a:t>-&gt; </a:t>
-            </a:r>
-            <a:r>
-              <a:rPr lang="en-US" sz="3200" dirty="0" smtClean="0"/>
-              <a:t>P2</a:t>
-            </a:r>
-            <a:endParaRPr lang="en-US" sz="3200" dirty="0" smtClean="0"/>
-          </a:p>
-          <a:p>
-            <a:r>
-              <a:rPr lang="en-US" sz="3200" dirty="0" smtClean="0"/>
-              <a:t>PDE </a:t>
-            </a:r>
-            <a:r>
-              <a:rPr lang="en-US" sz="3200" dirty="0" smtClean="0"/>
-              <a:t>build for RCP</a:t>
-            </a:r>
-          </a:p>
-          <a:p>
-            <a:r>
-              <a:rPr lang="en-US" sz="3200" dirty="0" smtClean="0"/>
-              <a:t>Oomph for Eclipse </a:t>
-            </a:r>
-            <a:r>
-              <a:rPr lang="en-US" sz="3200" dirty="0" smtClean="0"/>
-              <a:t>IDE-as-build-artifact</a:t>
+              <a:t>Oomph for Eclipse IDE-as-build-artifact</a:t>
             </a:r>
             <a:endParaRPr lang="en-US" sz="3200" dirty="0"/>
           </a:p>
@@ -15342,15 +15883,7 @@
           <a:p>
             <a:r>
               <a:rPr lang="en-US" dirty="0" smtClean="0"/>
-              <a:t>Maven vs </a:t>
-            </a:r>
-            <a:r>
-              <a:rPr lang="en-US" dirty="0" smtClean="0"/>
-              <a:t>p2</a:t>
-            </a:r>
-            <a:r>
-              <a:rPr lang="en-US" dirty="0" smtClean="0"/>
-              <a:t>: Composite repos</a:t>
+              <a:t>Maven vs p2: Composite repos</a:t>
             </a:r>
             <a:endParaRPr lang="en-US" dirty="0"/>
           </a:p>
@@ -15375,7 +15908,6 @@
               <a:rPr lang="en-US" dirty="0" smtClean="0"/>
               <a:t>Maven repositories tend to be monolithic</a:t>
             </a:r>
-            <a:endParaRPr lang="en-US" dirty="0" smtClean="0"/>
           </a:p>
           <a:p>
             <a:pPr lvl="1"/>
@@ -15394,8 +15926,16 @@
           </a:p>
           <a:p>
             <a:r>
+              <a:rPr lang="en-US" dirty="0"/>
+              <a:t>p</a:t>
+            </a:r>
+            <a:r>
               <a:rPr lang="en-US" dirty="0" smtClean="0"/>
-              <a:t>P2 often has a repo per-project and per-version</a:t>
+              <a:t>2 </a:t>
+            </a:r>
+            <a:r>
+              <a:rPr lang="en-US" dirty="0" smtClean="0"/>
+              <a:t>often has a repo per-project and per-version</a:t>
             </a:r>
             <a:endParaRPr lang="en-US" i="1" dirty="0" smtClean="0"/>
           </a:p>
@@ -15616,15 +16156,7 @@
             </a:r>
             <a:r>
               <a:rPr lang="en-US" dirty="0" smtClean="0"/>
-              <a:t>onsume </a:t>
-            </a:r>
-            <a:r>
-              <a:rPr lang="en-US" dirty="0" smtClean="0"/>
-              <a:t>deps from </a:t>
-            </a:r>
-            <a:r>
-              <a:rPr lang="en-US" dirty="0" smtClean="0"/>
-              <a:t>p2</a:t>
+              <a:t>onsume deps from p2</a:t>
             </a:r>
             <a:endParaRPr lang="en-US" dirty="0"/>
           </a:p>
@@ -15648,17 +16180,13 @@
         </p:spPr>
         <p:txBody>
           <a:bodyPr>
-            <a:normAutofit fontScale="92500" lnSpcReduction="10000"/>
+            <a:normAutofit fontScale="92500" lnSpcReduction="20000"/>
           </a:bodyPr>
           <a:lstStyle/>
           <a:p>
             <a:r>
               <a:rPr lang="en-US" dirty="0" smtClean="0"/>
-              <a:t>No native support at the </a:t>
-            </a:r>
-            <a:r>
-              <a:rPr lang="en-US" dirty="0" smtClean="0"/>
-              <a:t>moment</a:t>
+              <a:t>No native support at the moment</a:t>
             </a:r>
           </a:p>
           <a:p>
@@ -15697,33 +16225,64 @@
             </a:r>
             <a:r>
               <a:rPr lang="en-US" dirty="0" smtClean="0"/>
-              <a:t> &lt; 2.8)</a:t>
+              <a:t> &lt; 2.8</a:t>
+            </a:r>
+            <a:r>
+              <a:rPr lang="en-US" dirty="0" smtClean="0"/>
+              <a:t>)</a:t>
             </a:r>
           </a:p>
           <a:p>
             <a:pPr lvl="1"/>
             <a:r>
+              <a:rPr lang="en-US" dirty="0" smtClean="0"/>
+              <a:t>He also has a </a:t>
+            </a:r>
+            <a:r>
+              <a:rPr lang="en-US" dirty="0" smtClean="0">
+                <a:hlinkClick r:id="rId3"/>
+              </a:rPr>
+              <a:t>fork</a:t>
+            </a:r>
+            <a:r>
+              <a:rPr lang="en-US" dirty="0" smtClean="0"/>
+              <a:t> of </a:t>
+            </a:r>
+            <a:r>
+              <a:rPr lang="en-US" dirty="0" err="1" smtClean="0"/>
+              <a:t>Gradle</a:t>
+            </a:r>
+            <a:r>
+              <a:rPr lang="en-US" dirty="0" smtClean="0"/>
+              <a:t> 2.13 with p2 support</a:t>
+            </a:r>
+          </a:p>
+          <a:p>
+            <a:pPr lvl="1"/>
+            <a:r>
+              <a:rPr lang="en-US" dirty="0" err="1" smtClean="0"/>
+              <a:t>Gradle</a:t>
+            </a:r>
+            <a:r>
+              <a:rPr lang="en-US" dirty="0" smtClean="0"/>
+              <a:t> needs public repository API: </a:t>
+            </a:r>
+            <a:r>
               <a:rPr lang="en-US" sz="1900" dirty="0" smtClean="0">
-                <a:hlinkClick r:id="rId3"/>
-              </a:rPr>
-              <a:t>https</a:t>
-            </a:r>
-            <a:r>
-              <a:rPr lang="en-US" sz="1900" dirty="0" smtClean="0">
-                <a:hlinkClick r:id="rId3"/>
-              </a:rPr>
-              <a:t>://groups.google.com/forum/#!searchin/gradle-dev/p2/gradle-dev/YQ2-V-RizQg/swXSWeGmqboJ</a:t>
+                <a:hlinkClick r:id="rId4"/>
+              </a:rPr>
+              <a:t>https://groups.google.com/forum/#!searchin/gradle-dev/p2/gradle-dev/YQ2-V-RizQg/swXSWeGmqboJ</a:t>
             </a:r>
             <a:endParaRPr lang="en-US" sz="1900" dirty="0" smtClean="0"/>
           </a:p>
           <a:p>
             <a:r>
               <a:rPr lang="en-US" dirty="0" smtClean="0"/>
-              <a:t>Workaround A </a:t>
+              <a:t>Workaround </a:t>
             </a:r>
             <a:r>
               <a:rPr lang="en-US" dirty="0" smtClean="0"/>
-              <a:t>– turn p2 repository into a maven repository</a:t>
+              <a:t>A – turn p2 repository into a maven repository</a:t>
             </a:r>
           </a:p>
           <a:p>
@@ -15746,7 +16305,7 @@
             </a:r>
             <a:r>
               <a:rPr lang="en-US" dirty="0" err="1" smtClean="0">
-                <a:hlinkClick r:id="rId4"/>
+                <a:hlinkClick r:id="rId5"/>
               </a:rPr>
               <a:t>Wuff</a:t>
             </a:r>
@@ -15760,7 +16319,7 @@
             </a:r>
             <a:r>
               <a:rPr lang="en-US" dirty="0" err="1" smtClean="0">
-                <a:hlinkClick r:id="rId5"/>
+                <a:hlinkClick r:id="rId6"/>
               </a:rPr>
               <a:t>Unpuzzle</a:t>
             </a:r>
@@ -15798,7 +16357,7 @@
             </a:r>
             <a:r>
               <a:rPr lang="en-US" dirty="0" smtClean="0">
-                <a:hlinkClick r:id="rId6"/>
+                <a:hlinkClick r:id="rId7"/>
               </a:rPr>
               <a:t>fork</a:t>
             </a:r>
@@ -15858,7 +16417,6 @@
               <a:rPr lang="en-US" dirty="0" smtClean="0"/>
               <a:t>Requires manually specifying every single version.</a:t>
             </a:r>
-            <a:endParaRPr lang="en-US" dirty="0" smtClean="0"/>
           </a:p>
         </p:txBody>
       </p:sp>
@@ -15871,7 +16429,7 @@
           <p:nvPr/>
         </p:nvPicPr>
         <p:blipFill rotWithShape="1">
-          <a:blip r:embed="rId7">
+          <a:blip r:embed="rId8">
             <a:extLst>
               <a:ext uri="{28A0092B-C50C-407E-A947-70E740481C1C}">
                 <a14:useLocalDpi xmlns:a14="http://schemas.microsoft.com/office/drawing/2010/main" val="0"/>
@@ -16024,33 +16582,15 @@
                                   </p:childTnLst>
                                 </p:cTn>
                               </p:par>
-                            </p:childTnLst>
-                          </p:cTn>
-                        </p:par>
-                      </p:childTnLst>
-                    </p:cTn>
-                  </p:par>
-                  <p:par>
-                    <p:cTn id="11" fill="hold">
-                      <p:stCondLst>
-                        <p:cond delay="indefinite"/>
-                      </p:stCondLst>
-                      <p:childTnLst>
-                        <p:par>
-                          <p:cTn id="12" fill="hold">
-                            <p:stCondLst>
-                              <p:cond delay="0"/>
-                            </p:stCondLst>
-                            <p:childTnLst>
                               <p:par>
-                                <p:cTn id="13" presetID="1" presetClass="entr" presetSubtype="0" fill="hold" nodeType="clickEffect">
+                                <p:cTn id="11" presetID="1" presetClass="entr" presetSubtype="0" fill="hold" nodeType="withEffect">
                                   <p:stCondLst>
                                     <p:cond delay="0"/>
                                   </p:stCondLst>
                                   <p:childTnLst>
                                     <p:set>
                                       <p:cBhvr>
-                                        <p:cTn id="14" dur="1" fill="hold">
+                                        <p:cTn id="12" dur="1" fill="hold">
                                           <p:stCondLst>
                                             <p:cond delay="0"/>
                                           </p:stCondLst>
@@ -16073,8 +16613,26 @@
                                   </p:childTnLst>
                                 </p:cTn>
                               </p:par>
+                            </p:childTnLst>
+                          </p:cTn>
+                        </p:par>
+                      </p:childTnLst>
+                    </p:cTn>
+                  </p:par>
+                  <p:par>
+                    <p:cTn id="13" fill="hold">
+                      <p:stCondLst>
+                        <p:cond delay="indefinite"/>
+                      </p:stCondLst>
+                      <p:childTnLst>
+                        <p:par>
+                          <p:cTn id="14" fill="hold">
+                            <p:stCondLst>
+                              <p:cond delay="0"/>
+                            </p:stCondLst>
+                            <p:childTnLst>
                               <p:par>
-                                <p:cTn id="15" presetID="1" presetClass="entr" presetSubtype="0" fill="hold" nodeType="withEffect">
+                                <p:cTn id="15" presetID="1" presetClass="entr" presetSubtype="0" fill="hold" nodeType="clickEffect">
                                   <p:stCondLst>
                                     <p:cond delay="0"/>
                                   </p:stCondLst>
@@ -16166,33 +16724,15 @@
                                   </p:childTnLst>
                                 </p:cTn>
                               </p:par>
-                            </p:childTnLst>
-                          </p:cTn>
-                        </p:par>
-                      </p:childTnLst>
-                    </p:cTn>
-                  </p:par>
-                  <p:par>
-                    <p:cTn id="21" fill="hold">
-                      <p:stCondLst>
-                        <p:cond delay="indefinite"/>
-                      </p:stCondLst>
-                      <p:childTnLst>
-                        <p:par>
-                          <p:cTn id="22" fill="hold">
-                            <p:stCondLst>
-                              <p:cond delay="0"/>
-                            </p:stCondLst>
-                            <p:childTnLst>
                               <p:par>
-                                <p:cTn id="23" presetID="1" presetClass="entr" presetSubtype="0" fill="hold" nodeType="clickEffect">
+                                <p:cTn id="21" presetID="1" presetClass="entr" presetSubtype="0" fill="hold" nodeType="withEffect">
                                   <p:stCondLst>
                                     <p:cond delay="0"/>
                                   </p:stCondLst>
                                   <p:childTnLst>
                                     <p:set>
                                       <p:cBhvr>
-                                        <p:cTn id="24" dur="1" fill="hold">
+                                        <p:cTn id="22" dur="1" fill="hold">
                                           <p:stCondLst>
                                             <p:cond delay="0"/>
                                           </p:stCondLst>
@@ -16215,8 +16755,26 @@
                                   </p:childTnLst>
                                 </p:cTn>
                               </p:par>
+                            </p:childTnLst>
+                          </p:cTn>
+                        </p:par>
+                      </p:childTnLst>
+                    </p:cTn>
+                  </p:par>
+                  <p:par>
+                    <p:cTn id="23" fill="hold">
+                      <p:stCondLst>
+                        <p:cond delay="indefinite"/>
+                      </p:stCondLst>
+                      <p:childTnLst>
+                        <p:par>
+                          <p:cTn id="24" fill="hold">
+                            <p:stCondLst>
+                              <p:cond delay="0"/>
+                            </p:stCondLst>
+                            <p:childTnLst>
                               <p:par>
-                                <p:cTn id="25" presetID="1" presetClass="entr" presetSubtype="0" fill="hold" nodeType="withEffect">
+                                <p:cTn id="25" presetID="1" presetClass="entr" presetSubtype="0" fill="hold" nodeType="clickEffect">
                                   <p:stCondLst>
                                     <p:cond delay="0"/>
                                   </p:stCondLst>
@@ -16263,6 +16821,37 @@
                                           <p:spTgt spid="3">
                                             <p:txEl>
                                               <p:pRg st="9" end="9"/>
+                                            </p:txEl>
+                                          </p:spTgt>
+                                        </p:tgtEl>
+                                        <p:attrNameLst>
+                                          <p:attrName>style.visibility</p:attrName>
+                                        </p:attrNameLst>
+                                      </p:cBhvr>
+                                      <p:to>
+                                        <p:strVal val="visible"/>
+                                      </p:to>
+                                    </p:set>
+                                  </p:childTnLst>
+                                </p:cTn>
+                              </p:par>
+                              <p:par>
+                                <p:cTn id="29" presetID="1" presetClass="entr" presetSubtype="0" fill="hold" nodeType="withEffect">
+                                  <p:stCondLst>
+                                    <p:cond delay="0"/>
+                                  </p:stCondLst>
+                                  <p:childTnLst>
+                                    <p:set>
+                                      <p:cBhvr>
+                                        <p:cTn id="30" dur="1" fill="hold">
+                                          <p:stCondLst>
+                                            <p:cond delay="0"/>
+                                          </p:stCondLst>
+                                        </p:cTn>
+                                        <p:tgtEl>
+                                          <p:spTgt spid="3">
+                                            <p:txEl>
+                                              <p:pRg st="10" end="10"/>
                                             </p:txEl>
                                           </p:spTgt>
                                         </p:tgtEl>

</xml_diff>

<commit_message>
Renamed target.frommaven/fromp2 to just target.maven/p2.
</commit_message>
<xml_diff>
--- a/Gradle and Eclipse RCP.pptx
+++ b/Gradle and Eclipse RCP.pptx
@@ -261,7 +261,7 @@
           <a:p>
             <a:fld id="{B8966210-D7C8-4A1C-B59E-033C29288170}" type="datetimeFigureOut">
               <a:rPr lang="en-US" smtClean="0"/>
-              <a:t>6/27/2016</a:t>
+              <a:t>6/28/2016</a:t>
             </a:fld>
             <a:endParaRPr lang="en-US"/>
           </a:p>
@@ -431,7 +431,7 @@
           <a:p>
             <a:fld id="{B8966210-D7C8-4A1C-B59E-033C29288170}" type="datetimeFigureOut">
               <a:rPr lang="en-US" smtClean="0"/>
-              <a:t>6/27/2016</a:t>
+              <a:t>6/28/2016</a:t>
             </a:fld>
             <a:endParaRPr lang="en-US"/>
           </a:p>
@@ -611,7 +611,7 @@
           <a:p>
             <a:fld id="{B8966210-D7C8-4A1C-B59E-033C29288170}" type="datetimeFigureOut">
               <a:rPr lang="en-US" smtClean="0"/>
-              <a:t>6/27/2016</a:t>
+              <a:t>6/28/2016</a:t>
             </a:fld>
             <a:endParaRPr lang="en-US"/>
           </a:p>
@@ -2029,7 +2029,7 @@
           <a:p>
             <a:fld id="{B8966210-D7C8-4A1C-B59E-033C29288170}" type="datetimeFigureOut">
               <a:rPr lang="en-US" smtClean="0"/>
-              <a:t>6/27/2016</a:t>
+              <a:t>6/28/2016</a:t>
             </a:fld>
             <a:endParaRPr lang="en-US"/>
           </a:p>
@@ -2861,7 +2861,7 @@
           <a:p>
             <a:fld id="{B8966210-D7C8-4A1C-B59E-033C29288170}" type="datetimeFigureOut">
               <a:rPr lang="en-US" smtClean="0"/>
-              <a:t>6/27/2016</a:t>
+              <a:t>6/28/2016</a:t>
             </a:fld>
             <a:endParaRPr lang="en-US"/>
           </a:p>
@@ -3093,7 +3093,7 @@
           <a:p>
             <a:fld id="{B8966210-D7C8-4A1C-B59E-033C29288170}" type="datetimeFigureOut">
               <a:rPr lang="en-US" smtClean="0"/>
-              <a:t>6/27/2016</a:t>
+              <a:t>6/28/2016</a:t>
             </a:fld>
             <a:endParaRPr lang="en-US"/>
           </a:p>
@@ -3460,7 +3460,7 @@
           <a:p>
             <a:fld id="{B8966210-D7C8-4A1C-B59E-033C29288170}" type="datetimeFigureOut">
               <a:rPr lang="en-US" smtClean="0"/>
-              <a:t>6/27/2016</a:t>
+              <a:t>6/28/2016</a:t>
             </a:fld>
             <a:endParaRPr lang="en-US"/>
           </a:p>
@@ -3578,7 +3578,7 @@
           <a:p>
             <a:fld id="{B8966210-D7C8-4A1C-B59E-033C29288170}" type="datetimeFigureOut">
               <a:rPr lang="en-US" smtClean="0"/>
-              <a:t>6/27/2016</a:t>
+              <a:t>6/28/2016</a:t>
             </a:fld>
             <a:endParaRPr lang="en-US"/>
           </a:p>
@@ -3673,7 +3673,7 @@
           <a:p>
             <a:fld id="{B8966210-D7C8-4A1C-B59E-033C29288170}" type="datetimeFigureOut">
               <a:rPr lang="en-US" smtClean="0"/>
-              <a:t>6/27/2016</a:t>
+              <a:t>6/28/2016</a:t>
             </a:fld>
             <a:endParaRPr lang="en-US"/>
           </a:p>
@@ -3950,7 +3950,7 @@
           <a:p>
             <a:fld id="{B8966210-D7C8-4A1C-B59E-033C29288170}" type="datetimeFigureOut">
               <a:rPr lang="en-US" smtClean="0"/>
-              <a:t>6/27/2016</a:t>
+              <a:t>6/28/2016</a:t>
             </a:fld>
             <a:endParaRPr lang="en-US"/>
           </a:p>
@@ -4207,7 +4207,7 @@
           <a:p>
             <a:fld id="{B8966210-D7C8-4A1C-B59E-033C29288170}" type="datetimeFigureOut">
               <a:rPr lang="en-US" smtClean="0"/>
-              <a:t>6/27/2016</a:t>
+              <a:t>6/28/2016</a:t>
             </a:fld>
             <a:endParaRPr lang="en-US"/>
           </a:p>
@@ -4420,7 +4420,7 @@
           <a:p>
             <a:fld id="{B8966210-D7C8-4A1C-B59E-033C29288170}" type="datetimeFigureOut">
               <a:rPr lang="en-US" smtClean="0"/>
-              <a:t>6/27/2016</a:t>
+              <a:t>6/28/2016</a:t>
             </a:fld>
             <a:endParaRPr lang="en-US"/>
           </a:p>
@@ -4856,7 +4856,7 @@
           </a:ln>
           <a:extLst>
             <a:ext uri="{C572A759-6A51-4108-AA02-DFA0A04FC94B}">
-              <ma14:wrappingTextBoxFlag xmlns="" xmlns:ma14="http://schemas.microsoft.com/office/mac/drawingml/2011/main" val="1"/>
+              <ma14:wrappingTextBoxFlag xmlns:ma14="http://schemas.microsoft.com/office/mac/drawingml/2011/main" xmlns="" val="1"/>
             </a:ext>
           </a:extLst>
         </p:spPr>
@@ -4893,7 +4893,7 @@
           </a:ln>
           <a:extLst>
             <a:ext uri="{C572A759-6A51-4108-AA02-DFA0A04FC94B}">
-              <ma14:wrappingTextBoxFlag xmlns="" xmlns:ma14="http://schemas.microsoft.com/office/mac/drawingml/2011/main" val="1"/>
+              <ma14:wrappingTextBoxFlag xmlns:ma14="http://schemas.microsoft.com/office/mac/drawingml/2011/main" xmlns="" val="1"/>
             </a:ext>
           </a:extLst>
         </p:spPr>
@@ -5841,7 +5841,7 @@
           </a:ln>
           <a:extLst>
             <a:ext uri="{C572A759-6A51-4108-AA02-DFA0A04FC94B}">
-              <ma14:wrappingTextBoxFlag xmlns="" xmlns:ma14="http://schemas.microsoft.com/office/mac/drawingml/2011/main" val="1"/>
+              <ma14:wrappingTextBoxFlag xmlns:ma14="http://schemas.microsoft.com/office/mac/drawingml/2011/main" xmlns="" val="1"/>
             </a:ext>
           </a:extLst>
         </p:spPr>
@@ -5878,7 +5878,7 @@
           </a:ln>
           <a:extLst>
             <a:ext uri="{C572A759-6A51-4108-AA02-DFA0A04FC94B}">
-              <ma14:wrappingTextBoxFlag xmlns="" xmlns:ma14="http://schemas.microsoft.com/office/mac/drawingml/2011/main" val="1"/>
+              <ma14:wrappingTextBoxFlag xmlns:ma14="http://schemas.microsoft.com/office/mac/drawingml/2011/main" xmlns="" val="1"/>
             </a:ext>
           </a:extLst>
         </p:spPr>
@@ -6989,7 +6989,7 @@
           </a:ln>
           <a:extLst>
             <a:ext uri="{C572A759-6A51-4108-AA02-DFA0A04FC94B}">
-              <ma14:wrappingTextBoxFlag xmlns="" xmlns:ma14="http://schemas.microsoft.com/office/mac/drawingml/2011/main" val="1"/>
+              <ma14:wrappingTextBoxFlag xmlns:ma14="http://schemas.microsoft.com/office/mac/drawingml/2011/main" xmlns="" val="1"/>
             </a:ext>
           </a:extLst>
         </p:spPr>
@@ -7078,7 +7078,7 @@
           </a:ln>
           <a:extLst>
             <a:ext uri="{C572A759-6A51-4108-AA02-DFA0A04FC94B}">
-              <ma14:wrappingTextBoxFlag xmlns="" xmlns:ma14="http://schemas.microsoft.com/office/mac/drawingml/2011/main" val="1"/>
+              <ma14:wrappingTextBoxFlag xmlns:ma14="http://schemas.microsoft.com/office/mac/drawingml/2011/main" xmlns="" val="1"/>
             </a:ext>
           </a:extLst>
         </p:spPr>
@@ -10654,8 +10654,8 @@
         </p:nvSpPr>
         <p:spPr>
           <a:xfrm>
-            <a:off x="628650" y="1426368"/>
-            <a:ext cx="7886700" cy="5346965"/>
+            <a:off x="628650" y="1426367"/>
+            <a:ext cx="7886700" cy="5524765"/>
           </a:xfrm>
         </p:spPr>
         <p:txBody>
@@ -10672,7 +10672,6 @@
               <a:rPr lang="en-US" sz="1600" dirty="0" smtClean="0"/>
               <a:t>om.diffplug.needs17</a:t>
             </a:r>
-            <a:endParaRPr lang="en-US" sz="1600" dirty="0" smtClean="0"/>
           </a:p>
           <a:p>
             <a:r>
@@ -10718,124 +10717,20 @@
             <a:endParaRPr lang="en-US" dirty="0" smtClean="0"/>
           </a:p>
           <a:p>
-            <a:pPr marL="0" indent="0">
-              <a:buNone/>
-            </a:pPr>
-            <a:endParaRPr lang="en-US" dirty="0" smtClean="0"/>
-          </a:p>
-          <a:p>
-            <a:r>
-              <a:rPr lang="en-US" dirty="0" err="1" smtClean="0"/>
-              <a:t>target.frommaven</a:t>
-            </a:r>
-            <a:r>
-              <a:rPr lang="en-US" dirty="0" smtClean="0"/>
-              <a:t> </a:t>
-            </a:r>
-            <a:r>
-              <a:rPr lang="en-US" sz="1800" b="1" dirty="0" err="1" smtClean="0">
+            <a:r>
+              <a:rPr lang="en-US" sz="2600" dirty="0" smtClean="0"/>
+              <a:t>spotless </a:t>
+            </a:r>
+            <a:r>
+              <a:rPr lang="en-US" sz="1700" b="1" dirty="0" err="1" smtClean="0">
                 <a:solidFill>
                   <a:srgbClr val="0000C0"/>
                 </a:solidFill>
                 <a:latin typeface="Consolas" panose="020B0609020204030204" pitchFamily="49" charset="0"/>
               </a:rPr>
-              <a:t>org.standardout.bnd</a:t>
-            </a:r>
-            <a:r>
-              <a:rPr lang="en-US" sz="1800" b="1" dirty="0" smtClean="0">
-                <a:solidFill>
-                  <a:srgbClr val="0000C0"/>
-                </a:solidFill>
-                <a:latin typeface="Consolas" panose="020B0609020204030204" pitchFamily="49" charset="0"/>
-              </a:rPr>
-              <a:t>-platform</a:t>
-            </a:r>
-          </a:p>
-          <a:p>
-            <a:pPr lvl="1"/>
-            <a:r>
-              <a:rPr lang="en-US" sz="1500" dirty="0" smtClean="0">
-                <a:solidFill>
-                  <a:srgbClr val="0000C0"/>
-                </a:solidFill>
-              </a:rPr>
-              <a:t>Creates folder containing all Maven deps with </a:t>
-            </a:r>
-            <a:r>
-              <a:rPr lang="en-US" sz="1500" dirty="0" err="1" smtClean="0">
-                <a:solidFill>
-                  <a:srgbClr val="0000C0"/>
-                </a:solidFill>
-              </a:rPr>
-              <a:t>OSGi</a:t>
-            </a:r>
-            <a:r>
-              <a:rPr lang="en-US" sz="1500" dirty="0" smtClean="0">
-                <a:solidFill>
-                  <a:srgbClr val="0000C0"/>
-                </a:solidFill>
-              </a:rPr>
-              <a:t> headers</a:t>
-            </a:r>
-          </a:p>
-          <a:p>
-            <a:r>
-              <a:rPr lang="en-US" dirty="0" smtClean="0"/>
-              <a:t>target.fromp2 </a:t>
-            </a:r>
-            <a:r>
-              <a:rPr lang="en-US" sz="1800" b="1" dirty="0" smtClean="0">
-                <a:solidFill>
-                  <a:srgbClr val="0000C0"/>
-                </a:solidFill>
-                <a:latin typeface="Consolas" panose="020B0609020204030204" pitchFamily="49" charset="0"/>
-              </a:rPr>
-              <a:t>com.diffplug.gradle.p2.asmaven</a:t>
-            </a:r>
-          </a:p>
-          <a:p>
-            <a:pPr lvl="1"/>
-            <a:r>
-              <a:rPr lang="en-US" sz="1500" dirty="0" smtClean="0">
-                <a:solidFill>
-                  <a:srgbClr val="0000C0"/>
-                </a:solidFill>
-              </a:rPr>
-              <a:t>Creates folder containing all deps from p2, and gives </a:t>
-            </a:r>
-            <a:r>
-              <a:rPr lang="en-US" sz="1500" dirty="0" err="1" smtClean="0">
-                <a:solidFill>
-                  <a:srgbClr val="0000C0"/>
-                </a:solidFill>
-              </a:rPr>
-              <a:t>Gradle</a:t>
-            </a:r>
-            <a:r>
-              <a:rPr lang="en-US" sz="1500" dirty="0" smtClean="0">
-                <a:solidFill>
-                  <a:srgbClr val="0000C0"/>
-                </a:solidFill>
-              </a:rPr>
-              <a:t> access to the artifacts.</a:t>
-            </a:r>
-            <a:endParaRPr lang="en-US" sz="1500" dirty="0" smtClean="0"/>
-          </a:p>
-          <a:p>
-            <a:r>
-              <a:rPr lang="en-US" dirty="0" smtClean="0"/>
-              <a:t>deploy </a:t>
-            </a:r>
-            <a:r>
-              <a:rPr lang="en-US" sz="1800" b="1" dirty="0" err="1" smtClean="0">
-                <a:solidFill>
-                  <a:srgbClr val="0000C0"/>
-                </a:solidFill>
-                <a:latin typeface="Consolas" panose="020B0609020204030204" pitchFamily="49" charset="0"/>
-              </a:rPr>
-              <a:t>com.diffplug.gradle.pde.PdeBuild</a:t>
-            </a:r>
-            <a:endParaRPr lang="en-US" sz="1000" b="1" dirty="0" smtClean="0">
+              <a:t>com.diffplug.gradle.spotless</a:t>
+            </a:r>
+            <a:endParaRPr lang="en-US" sz="1700" b="1" dirty="0" smtClean="0">
               <a:solidFill>
                 <a:srgbClr val="0000C0"/>
               </a:solidFill>
@@ -10845,54 +10740,99 @@
           <a:p>
             <a:pPr lvl="1"/>
             <a:r>
-              <a:rPr lang="en-US" sz="1500" dirty="0" smtClean="0">
+              <a:rPr lang="en-US" sz="1500" dirty="0" smtClean="0"/>
+              <a:t>Formats source code using eclipse formatter.</a:t>
+            </a:r>
+            <a:endParaRPr lang="en-US" sz="1500" dirty="0" smtClean="0"/>
+          </a:p>
+          <a:p>
+            <a:r>
+              <a:rPr lang="en-US" sz="2600" dirty="0" err="1" smtClean="0"/>
+              <a:t>target.maven</a:t>
+            </a:r>
+            <a:r>
+              <a:rPr lang="en-US" sz="2600" dirty="0" smtClean="0"/>
+              <a:t> </a:t>
+            </a:r>
+            <a:r>
+              <a:rPr lang="en-US" sz="1700" b="1" dirty="0" err="1" smtClean="0">
                 <a:solidFill>
                   <a:srgbClr val="0000C0"/>
                 </a:solidFill>
-              </a:rPr>
-              <a:t>Runs PDE build against plugins from both </a:t>
-            </a:r>
-            <a:r>
-              <a:rPr lang="en-US" sz="1500" b="1" dirty="0" smtClean="0">
+                <a:latin typeface="Consolas" panose="020B0609020204030204" pitchFamily="49" charset="0"/>
+              </a:rPr>
+              <a:t>org.standardout.bnd</a:t>
+            </a:r>
+            <a:r>
+              <a:rPr lang="en-US" sz="1700" b="1" dirty="0" smtClean="0">
                 <a:solidFill>
                   <a:srgbClr val="0000C0"/>
                 </a:solidFill>
                 <a:latin typeface="Consolas" panose="020B0609020204030204" pitchFamily="49" charset="0"/>
               </a:rPr>
-              <a:t>target</a:t>
-            </a:r>
-            <a:r>
-              <a:rPr lang="en-US" sz="1500" dirty="0" smtClean="0">
+              <a:t>-platform</a:t>
+            </a:r>
+          </a:p>
+          <a:p>
+            <a:pPr lvl="1"/>
+            <a:r>
+              <a:rPr lang="en-US" sz="1500" dirty="0" smtClean="0"/>
+              <a:t>Creates folder containing all Maven deps with </a:t>
+            </a:r>
+            <a:r>
+              <a:rPr lang="en-US" sz="1500" dirty="0" err="1" smtClean="0"/>
+              <a:t>OSGi</a:t>
+            </a:r>
+            <a:r>
+              <a:rPr lang="en-US" sz="1500" dirty="0" smtClean="0"/>
+              <a:t> headers</a:t>
+            </a:r>
+          </a:p>
+          <a:p>
+            <a:r>
+              <a:rPr lang="en-US" sz="2600" dirty="0" smtClean="0"/>
+              <a:t>target.p2 </a:t>
+            </a:r>
+            <a:r>
+              <a:rPr lang="en-US" sz="1700" b="1" dirty="0" smtClean="0">
                 <a:solidFill>
                   <a:srgbClr val="0000C0"/>
                 </a:solidFill>
-              </a:rPr>
-              <a:t> folders</a:t>
-            </a:r>
-            <a:r>
-              <a:rPr lang="en-US" sz="1500" dirty="0" smtClean="0">
+                <a:latin typeface="Consolas" panose="020B0609020204030204" pitchFamily="49" charset="0"/>
+              </a:rPr>
+              <a:t>com.diffplug.gradle.p2.asmaven</a:t>
+            </a:r>
+          </a:p>
+          <a:p>
+            <a:pPr lvl="1"/>
+            <a:r>
+              <a:rPr lang="en-US" sz="1500" dirty="0" smtClean="0"/>
+              <a:t>Creates folder containing all deps from p2, and gives </a:t>
+            </a:r>
+            <a:r>
+              <a:rPr lang="en-US" sz="1500" dirty="0" err="1" smtClean="0"/>
+              <a:t>Gradle</a:t>
+            </a:r>
+            <a:r>
+              <a:rPr lang="en-US" sz="1500" dirty="0" smtClean="0"/>
+              <a:t> access to the artifacts.</a:t>
+            </a:r>
+          </a:p>
+          <a:p>
+            <a:r>
+              <a:rPr lang="en-US" sz="2600" dirty="0" smtClean="0"/>
+              <a:t>deploy </a:t>
+            </a:r>
+            <a:r>
+              <a:rPr lang="en-US" sz="1700" b="1" dirty="0" err="1" smtClean="0">
                 <a:solidFill>
                   <a:srgbClr val="0000C0"/>
                 </a:solidFill>
-              </a:rPr>
-              <a:t>.</a:t>
-            </a:r>
-          </a:p>
-          <a:p>
-            <a:r>
-              <a:rPr lang="en-US" dirty="0" smtClean="0"/>
-              <a:t>ide </a:t>
-            </a:r>
-            <a:r>
-              <a:rPr lang="en-US" sz="1800" b="1" dirty="0" err="1" smtClean="0">
-                <a:solidFill>
-                  <a:srgbClr val="0000C0"/>
-                </a:solidFill>
-                <a:latin typeface="Consolas" panose="020B0609020204030204" pitchFamily="49" charset="0"/>
-              </a:rPr>
-              <a:t>com.diffplug.gradle.oomph.ide</a:t>
-            </a:r>
-            <a:endParaRPr lang="en-US" sz="1800" b="1" dirty="0" smtClean="0">
+                <a:latin typeface="Consolas" panose="020B0609020204030204" pitchFamily="49" charset="0"/>
+              </a:rPr>
+              <a:t>com.diffplug.gradle.pde.PdeBuild</a:t>
+            </a:r>
+            <a:endParaRPr lang="en-US" sz="900" b="1" dirty="0" smtClean="0">
               <a:solidFill>
                 <a:srgbClr val="0000C0"/>
               </a:solidFill>
@@ -10902,18 +10842,48 @@
           <a:p>
             <a:pPr lvl="1"/>
             <a:r>
-              <a:rPr lang="en-US" sz="1500" dirty="0" smtClean="0">
+              <a:rPr lang="en-US" sz="1500" dirty="0" smtClean="0"/>
+              <a:t>Runs PDE build against plugins from both </a:t>
+            </a:r>
+            <a:r>
+              <a:rPr lang="en-US" sz="1500" b="1" dirty="0" smtClean="0">
+                <a:latin typeface="Consolas" panose="020B0609020204030204" pitchFamily="49" charset="0"/>
+              </a:rPr>
+              <a:t>target</a:t>
+            </a:r>
+            <a:r>
+              <a:rPr lang="en-US" sz="1500" dirty="0" smtClean="0"/>
+              <a:t> folders.</a:t>
+            </a:r>
+          </a:p>
+          <a:p>
+            <a:r>
+              <a:rPr lang="en-US" sz="2600" dirty="0" smtClean="0"/>
+              <a:t>ide </a:t>
+            </a:r>
+            <a:r>
+              <a:rPr lang="en-US" sz="1700" b="1" dirty="0" err="1" smtClean="0">
                 <a:solidFill>
                   <a:srgbClr val="0000C0"/>
                 </a:solidFill>
-              </a:rPr>
-              <a:t>Creates an IDE containing this entire project.</a:t>
-            </a:r>
-            <a:endParaRPr lang="en-US" sz="1500" dirty="0">
+                <a:latin typeface="Consolas" panose="020B0609020204030204" pitchFamily="49" charset="0"/>
+              </a:rPr>
+              <a:t>com.diffplug.gradle.oomph.ide</a:t>
+            </a:r>
+            <a:endParaRPr lang="en-US" sz="1700" b="1" dirty="0" smtClean="0">
               <a:solidFill>
                 <a:srgbClr val="0000C0"/>
               </a:solidFill>
+              <a:latin typeface="Consolas" panose="020B0609020204030204" pitchFamily="49" charset="0"/>
             </a:endParaRPr>
+          </a:p>
+          <a:p>
+            <a:pPr lvl="1"/>
+            <a:r>
+              <a:rPr lang="en-US" sz="1500" dirty="0" smtClean="0"/>
+              <a:t>Creates an IDE containing this entire project.</a:t>
+            </a:r>
+            <a:endParaRPr lang="en-US" sz="1500" dirty="0"/>
           </a:p>
           <a:p>
             <a:pPr lvl="1"/>
@@ -10944,7 +10914,7 @@
         </p:nvSpPr>
         <p:spPr>
           <a:xfrm>
-            <a:off x="3409950" y="1358900"/>
+            <a:off x="3409950" y="1257300"/>
             <a:ext cx="5734050" cy="2451100"/>
           </a:xfrm>
           <a:prstGeom prst="rect">
@@ -11148,27 +11118,15 @@
               </a:lnSpc>
             </a:pPr>
             <a:r>
-              <a:rPr lang="en-US" sz="1700" dirty="0" smtClean="0">
-                <a:solidFill>
-                  <a:srgbClr val="0000C0"/>
-                </a:solidFill>
-              </a:rPr>
+              <a:rPr lang="en-US" sz="1700" dirty="0" smtClean="0"/>
               <a:t>Generate </a:t>
             </a:r>
             <a:r>
-              <a:rPr lang="en-US" sz="1700" dirty="0" err="1" smtClean="0">
-                <a:solidFill>
-                  <a:srgbClr val="0000C0"/>
-                </a:solidFill>
-              </a:rPr>
+              <a:rPr lang="en-US" sz="1700" dirty="0" err="1" smtClean="0"/>
               <a:t>OSGi</a:t>
             </a:r>
             <a:r>
-              <a:rPr lang="en-US" sz="1700" dirty="0" smtClean="0">
-                <a:solidFill>
-                  <a:srgbClr val="0000C0"/>
-                </a:solidFill>
-              </a:rPr>
+              <a:rPr lang="en-US" sz="1700" dirty="0" smtClean="0"/>
               <a:t> manifest</a:t>
             </a:r>
           </a:p>
@@ -11201,44 +11159,25 @@
               </a:lnSpc>
             </a:pPr>
             <a:r>
-              <a:rPr lang="en-US" sz="1700" dirty="0" smtClean="0">
-                <a:solidFill>
-                  <a:srgbClr val="0000C0"/>
-                </a:solidFill>
-              </a:rPr>
+              <a:rPr lang="en-US" sz="1700" dirty="0" smtClean="0"/>
               <a:t>Uses Eclipse’s </a:t>
             </a:r>
             <a:r>
               <a:rPr lang="en-US" sz="1700" b="1" dirty="0" err="1" smtClean="0">
-                <a:solidFill>
-                  <a:srgbClr val="0000C0"/>
-                </a:solidFill>
                 <a:latin typeface="Consolas" panose="020B0609020204030204" pitchFamily="49" charset="0"/>
               </a:rPr>
               <a:t>build.properties</a:t>
             </a:r>
             <a:r>
-              <a:rPr lang="en-US" sz="1700" dirty="0" smtClean="0">
-                <a:solidFill>
-                  <a:srgbClr val="0000C0"/>
-                </a:solidFill>
-              </a:rPr>
+              <a:rPr lang="en-US" sz="1700" dirty="0" smtClean="0"/>
               <a:t> to control </a:t>
             </a:r>
             <a:r>
-              <a:rPr lang="en-US" sz="1700" dirty="0" err="1" smtClean="0">
-                <a:solidFill>
-                  <a:srgbClr val="0000C0"/>
-                </a:solidFill>
-              </a:rPr>
+              <a:rPr lang="en-US" sz="1700" dirty="0" err="1" smtClean="0"/>
               <a:t>gradle</a:t>
             </a:r>
             <a:r>
-              <a:rPr lang="en-US" sz="1700" dirty="0" smtClean="0">
-                <a:solidFill>
-                  <a:srgbClr val="0000C0"/>
-                </a:solidFill>
-              </a:rPr>
+              <a:rPr lang="en-US" sz="1700" dirty="0" smtClean="0"/>
               <a:t> build</a:t>
             </a:r>
           </a:p>
@@ -11271,27 +11210,15 @@
               </a:lnSpc>
             </a:pPr>
             <a:r>
-              <a:rPr lang="en-US" sz="1700" dirty="0" smtClean="0">
-                <a:solidFill>
-                  <a:srgbClr val="0000C0"/>
-                </a:solidFill>
-              </a:rPr>
+              <a:rPr lang="en-US" sz="1700" dirty="0" smtClean="0"/>
               <a:t>Keeps </a:t>
             </a:r>
             <a:r>
-              <a:rPr lang="en-US" sz="1700" dirty="0" err="1" smtClean="0">
-                <a:solidFill>
-                  <a:srgbClr val="0000C0"/>
-                </a:solidFill>
-              </a:rPr>
+              <a:rPr lang="en-US" sz="1700" dirty="0" err="1" smtClean="0"/>
               <a:t>Gradle’s</a:t>
             </a:r>
             <a:r>
-              <a:rPr lang="en-US" sz="1700" dirty="0" smtClean="0">
-                <a:solidFill>
-                  <a:srgbClr val="0000C0"/>
-                </a:solidFill>
-              </a:rPr>
+              <a:rPr lang="en-US" sz="1700" dirty="0" smtClean="0"/>
               <a:t> binary artifacts out of Eclipse’s resources search</a:t>
             </a:r>
           </a:p>
@@ -11324,27 +11251,15 @@
               </a:lnSpc>
             </a:pPr>
             <a:r>
-              <a:rPr lang="en-US" sz="1600" dirty="0" smtClean="0">
-                <a:solidFill>
-                  <a:srgbClr val="0000C0"/>
-                </a:solidFill>
-              </a:rPr>
+              <a:rPr lang="en-US" sz="1600" dirty="0" smtClean="0"/>
               <a:t>Fixes eclipse </a:t>
             </a:r>
             <a:r>
-              <a:rPr lang="en-US" sz="1600" dirty="0" err="1" smtClean="0">
-                <a:solidFill>
-                  <a:srgbClr val="0000C0"/>
-                </a:solidFill>
-              </a:rPr>
+              <a:rPr lang="en-US" sz="1600" dirty="0" err="1" smtClean="0"/>
               <a:t>intraproject</a:t>
             </a:r>
             <a:r>
-              <a:rPr lang="en-US" sz="1600" dirty="0" smtClean="0">
-                <a:solidFill>
-                  <a:srgbClr val="0000C0"/>
-                </a:solidFill>
-              </a:rPr>
+              <a:rPr lang="en-US" sz="1600" dirty="0" smtClean="0"/>
               <a:t> dependency problems</a:t>
             </a:r>
           </a:p>
@@ -11771,7 +11686,7 @@
                                         <p:tgtEl>
                                           <p:spTgt spid="5">
                                             <p:txEl>
-                                              <p:pRg st="8" end="8"/>
+                                              <p:pRg st="7" end="7"/>
                                             </p:txEl>
                                           </p:spTgt>
                                         </p:tgtEl>
@@ -11802,7 +11717,7 @@
                                         <p:tgtEl>
                                           <p:spTgt spid="5">
                                             <p:txEl>
-                                              <p:pRg st="9" end="9"/>
+                                              <p:pRg st="8" end="8"/>
                                             </p:txEl>
                                           </p:spTgt>
                                         </p:tgtEl>
@@ -11851,7 +11766,7 @@
                                         <p:tgtEl>
                                           <p:spTgt spid="5">
                                             <p:txEl>
-                                              <p:pRg st="10" end="10"/>
+                                              <p:pRg st="9" end="9"/>
                                             </p:txEl>
                                           </p:spTgt>
                                         </p:tgtEl>
@@ -11882,7 +11797,7 @@
                                         <p:tgtEl>
                                           <p:spTgt spid="5">
                                             <p:txEl>
-                                              <p:pRg st="11" end="11"/>
+                                              <p:pRg st="10" end="10"/>
                                             </p:txEl>
                                           </p:spTgt>
                                         </p:tgtEl>
@@ -11931,7 +11846,7 @@
                                         <p:tgtEl>
                                           <p:spTgt spid="5">
                                             <p:txEl>
-                                              <p:pRg st="12" end="12"/>
+                                              <p:pRg st="11" end="11"/>
                                             </p:txEl>
                                           </p:spTgt>
                                         </p:tgtEl>
@@ -11962,6 +11877,55 @@
                                         <p:tgtEl>
                                           <p:spTgt spid="5">
                                             <p:txEl>
+                                              <p:pRg st="12" end="12"/>
+                                            </p:txEl>
+                                          </p:spTgt>
+                                        </p:tgtEl>
+                                        <p:attrNameLst>
+                                          <p:attrName>style.visibility</p:attrName>
+                                        </p:attrNameLst>
+                                      </p:cBhvr>
+                                      <p:to>
+                                        <p:strVal val="visible"/>
+                                      </p:to>
+                                    </p:set>
+                                  </p:childTnLst>
+                                </p:cTn>
+                              </p:par>
+                            </p:childTnLst>
+                          </p:cTn>
+                        </p:par>
+                      </p:childTnLst>
+                    </p:cTn>
+                  </p:par>
+                  <p:par>
+                    <p:cTn id="45" fill="hold">
+                      <p:stCondLst>
+                        <p:cond delay="indefinite"/>
+                      </p:stCondLst>
+                      <p:childTnLst>
+                        <p:par>
+                          <p:cTn id="46" fill="hold">
+                            <p:stCondLst>
+                              <p:cond delay="0"/>
+                            </p:stCondLst>
+                            <p:childTnLst>
+                              <p:par>
+                                <p:cTn id="47" presetID="1" presetClass="entr" presetSubtype="0" fill="hold" nodeType="clickEffect">
+                                  <p:stCondLst>
+                                    <p:cond delay="0"/>
+                                  </p:stCondLst>
+                                  <p:childTnLst>
+                                    <p:set>
+                                      <p:cBhvr>
+                                        <p:cTn id="48" dur="1" fill="hold">
+                                          <p:stCondLst>
+                                            <p:cond delay="0"/>
+                                          </p:stCondLst>
+                                        </p:cTn>
+                                        <p:tgtEl>
+                                          <p:spTgt spid="5">
+                                            <p:txEl>
                                               <p:pRg st="13" end="13"/>
                                             </p:txEl>
                                           </p:spTgt>
@@ -11978,14 +11942,14 @@
                                 </p:cTn>
                               </p:par>
                               <p:par>
-                                <p:cTn id="45" presetID="1" presetClass="entr" presetSubtype="0" fill="hold" nodeType="withEffect">
+                                <p:cTn id="49" presetID="1" presetClass="entr" presetSubtype="0" fill="hold" nodeType="withEffect">
                                   <p:stCondLst>
                                     <p:cond delay="0"/>
                                   </p:stCondLst>
                                   <p:childTnLst>
                                     <p:set>
                                       <p:cBhvr>
-                                        <p:cTn id="46" dur="1" fill="hold">
+                                        <p:cTn id="50" dur="1" fill="hold">
                                           <p:stCondLst>
                                             <p:cond delay="0"/>
                                           </p:stCondLst>
@@ -12008,15 +11972,33 @@
                                   </p:childTnLst>
                                 </p:cTn>
                               </p:par>
+                            </p:childTnLst>
+                          </p:cTn>
+                        </p:par>
+                      </p:childTnLst>
+                    </p:cTn>
+                  </p:par>
+                  <p:par>
+                    <p:cTn id="51" fill="hold">
+                      <p:stCondLst>
+                        <p:cond delay="indefinite"/>
+                      </p:stCondLst>
+                      <p:childTnLst>
+                        <p:par>
+                          <p:cTn id="52" fill="hold">
+                            <p:stCondLst>
+                              <p:cond delay="0"/>
+                            </p:stCondLst>
+                            <p:childTnLst>
                               <p:par>
-                                <p:cTn id="47" presetID="1" presetClass="entr" presetSubtype="0" fill="hold" nodeType="withEffect">
+                                <p:cTn id="53" presetID="1" presetClass="entr" presetSubtype="0" fill="hold" nodeType="clickEffect">
                                   <p:stCondLst>
                                     <p:cond delay="0"/>
                                   </p:stCondLst>
                                   <p:childTnLst>
                                     <p:set>
                                       <p:cBhvr>
-                                        <p:cTn id="48" dur="1" fill="hold">
+                                        <p:cTn id="54" dur="1" fill="hold">
                                           <p:stCondLst>
                                             <p:cond delay="0"/>
                                           </p:stCondLst>
@@ -12025,6 +12007,37 @@
                                           <p:spTgt spid="5">
                                             <p:txEl>
                                               <p:pRg st="15" end="15"/>
+                                            </p:txEl>
+                                          </p:spTgt>
+                                        </p:tgtEl>
+                                        <p:attrNameLst>
+                                          <p:attrName>style.visibility</p:attrName>
+                                        </p:attrNameLst>
+                                      </p:cBhvr>
+                                      <p:to>
+                                        <p:strVal val="visible"/>
+                                      </p:to>
+                                    </p:set>
+                                  </p:childTnLst>
+                                </p:cTn>
+                              </p:par>
+                              <p:par>
+                                <p:cTn id="55" presetID="1" presetClass="entr" presetSubtype="0" fill="hold" nodeType="withEffect">
+                                  <p:stCondLst>
+                                    <p:cond delay="0"/>
+                                  </p:stCondLst>
+                                  <p:childTnLst>
+                                    <p:set>
+                                      <p:cBhvr>
+                                        <p:cTn id="56" dur="1" fill="hold">
+                                          <p:stCondLst>
+                                            <p:cond delay="0"/>
+                                          </p:stCondLst>
+                                        </p:cTn>
+                                        <p:tgtEl>
+                                          <p:spTgt spid="5">
+                                            <p:txEl>
+                                              <p:pRg st="16" end="16"/>
                                             </p:txEl>
                                           </p:spTgt>
                                         </p:tgtEl>
@@ -13140,6 +13153,33 @@
               <a:t>(</a:t>
             </a:r>
             <a:r>
+              <a:rPr lang="en-US" dirty="0" smtClean="0">
+                <a:solidFill>
+                  <a:srgbClr val="0000C0"/>
+                </a:solidFill>
+                <a:latin typeface="Consolas" panose="020B0609020204030204" pitchFamily="49" charset="0"/>
+              </a:rPr>
+              <a:t>'</a:t>
+            </a:r>
+            <a:r>
+              <a:rPr lang="en-US" dirty="0" err="1" smtClean="0">
+                <a:solidFill>
+                  <a:srgbClr val="0000C0"/>
+                </a:solidFill>
+                <a:latin typeface="Consolas" panose="020B0609020204030204" pitchFamily="49" charset="0"/>
+              </a:rPr>
+              <a:t>target.maven</a:t>
+            </a:r>
+            <a:r>
+              <a:rPr lang="en-US" dirty="0" smtClean="0">
+                <a:solidFill>
+                  <a:srgbClr val="0000C0"/>
+                </a:solidFill>
+                <a:latin typeface="Consolas" panose="020B0609020204030204" pitchFamily="49" charset="0"/>
+              </a:rPr>
+              <a:t>/build</a:t>
+            </a:r>
+            <a:r>
               <a:rPr lang="en-US" dirty="0">
                 <a:solidFill>
                   <a:srgbClr val="0000C0"/>
@@ -13149,13 +13189,42 @@
               <a:t>'</a:t>
             </a:r>
             <a:r>
-              <a:rPr lang="en-US" dirty="0" err="1">
+              <a:rPr lang="en-US" dirty="0">
+                <a:solidFill>
+                  <a:srgbClr val="000000"/>
+                </a:solidFill>
+                <a:latin typeface="Consolas" panose="020B0609020204030204" pitchFamily="49" charset="0"/>
+              </a:rPr>
+              <a:t>)</a:t>
+            </a:r>
+          </a:p>
+          <a:p>
+            <a:r>
+              <a:rPr lang="en-US" dirty="0" smtClean="0">
+                <a:solidFill>
+                  <a:srgbClr val="000000"/>
+                </a:solidFill>
+                <a:latin typeface="Consolas" panose="020B0609020204030204" pitchFamily="49" charset="0"/>
+              </a:rPr>
+              <a:t>        installation</a:t>
+            </a:r>
+            <a:r>
+              <a:rPr lang="en-US" dirty="0">
+                <a:solidFill>
+                  <a:srgbClr val="000000"/>
+                </a:solidFill>
+                <a:latin typeface="Consolas" panose="020B0609020204030204" pitchFamily="49" charset="0"/>
+              </a:rPr>
+              <a:t>(</a:t>
+            </a:r>
+            <a:r>
+              <a:rPr lang="en-US" dirty="0" smtClean="0">
                 <a:solidFill>
                   <a:srgbClr val="0000C0"/>
                 </a:solidFill>
                 <a:latin typeface="Consolas" panose="020B0609020204030204" pitchFamily="49" charset="0"/>
               </a:rPr>
-              <a:t>target.frommaven</a:t>
+              <a:t>'target.p2/build/p2asmaven/p2</a:t>
             </a:r>
             <a:r>
               <a:rPr lang="en-US" dirty="0">
@@ -13164,45 +13233,7 @@
                 </a:solidFill>
                 <a:latin typeface="Consolas" panose="020B0609020204030204" pitchFamily="49" charset="0"/>
               </a:rPr>
-              <a:t>/build'</a:t>
-            </a:r>
-            <a:r>
-              <a:rPr lang="en-US" dirty="0">
-                <a:solidFill>
-                  <a:srgbClr val="000000"/>
-                </a:solidFill>
-                <a:latin typeface="Consolas" panose="020B0609020204030204" pitchFamily="49" charset="0"/>
-              </a:rPr>
-              <a:t>)</a:t>
-            </a:r>
-          </a:p>
-          <a:p>
-            <a:r>
-              <a:rPr lang="en-US" dirty="0" smtClean="0">
-                <a:solidFill>
-                  <a:srgbClr val="000000"/>
-                </a:solidFill>
-                <a:latin typeface="Consolas" panose="020B0609020204030204" pitchFamily="49" charset="0"/>
-              </a:rPr>
-              <a:t>        installation</a:t>
-            </a:r>
-            <a:r>
-              <a:rPr lang="en-US" dirty="0">
-                <a:solidFill>
-                  <a:srgbClr val="000000"/>
-                </a:solidFill>
-                <a:latin typeface="Consolas" panose="020B0609020204030204" pitchFamily="49" charset="0"/>
-              </a:rPr>
-              <a:t>(</a:t>
-            </a:r>
-            <a:r>
-              <a:rPr lang="en-US" dirty="0">
-                <a:solidFill>
-                  <a:srgbClr val="0000C0"/>
-                </a:solidFill>
-                <a:latin typeface="Consolas" panose="020B0609020204030204" pitchFamily="49" charset="0"/>
-              </a:rPr>
-              <a:t>'target.fromp2/build/goomph-p2asmaven/p2'</a:t>
+              <a:t>'</a:t>
             </a:r>
             <a:r>
               <a:rPr lang="en-US" dirty="0">
@@ -13301,7 +13332,7 @@
           </a:ln>
           <a:extLst>
             <a:ext uri="{C572A759-6A51-4108-AA02-DFA0A04FC94B}">
-              <ma14:wrappingTextBoxFlag xmlns="" xmlns:ma14="http://schemas.microsoft.com/office/mac/drawingml/2011/main" val="1"/>
+              <ma14:wrappingTextBoxFlag xmlns:ma14="http://schemas.microsoft.com/office/mac/drawingml/2011/main" xmlns="" val="1"/>
             </a:ext>
           </a:extLst>
         </p:spPr>

</xml_diff>

<commit_message>
Added the gradlephant and a title card.
</commit_message>
<xml_diff>
--- a/Gradle and Eclipse RCP.pptx
+++ b/Gradle and Eclipse RCP.pptx
@@ -7,7 +7,7 @@
     <p:sldMasterId id="2147483720" r:id="rId3"/>
   </p:sldMasterIdLst>
   <p:notesMasterIdLst>
-    <p:notesMasterId r:id="rId29"/>
+    <p:notesMasterId r:id="rId30"/>
   </p:notesMasterIdLst>
   <p:sldIdLst>
     <p:sldId id="295" r:id="rId4"/>
@@ -35,6 +35,7 @@
     <p:sldId id="289" r:id="rId26"/>
     <p:sldId id="313" r:id="rId27"/>
     <p:sldId id="294" r:id="rId28"/>
+    <p:sldId id="314" r:id="rId29"/>
   </p:sldIdLst>
   <p:sldSz cx="12192000" cy="6858000"/>
   <p:notesSz cx="6858000" cy="9144000"/>
@@ -223,7 +224,7 @@
           <a:p>
             <a:fld id="{D4294C56-2474-44E4-862C-BB9801C7C2A0}" type="datetimeFigureOut">
               <a:rPr lang="en-US" smtClean="0"/>
-              <a:t>3/15/2017</a:t>
+              <a:t>3/19/2017</a:t>
             </a:fld>
             <a:endParaRPr lang="en-US"/>
           </a:p>
@@ -535,6 +536,22 @@
           <a:bodyPr/>
           <a:lstStyle/>
           <a:p>
+            <a:r>
+              <a:rPr lang="en-US" dirty="0" smtClean="0"/>
+              <a:t>SETUP:</a:t>
+            </a:r>
+            <a:r>
+              <a:rPr lang="en-US" baseline="0" dirty="0" smtClean="0"/>
+              <a:t> lsp4j and </a:t>
+            </a:r>
+            <a:r>
+              <a:rPr lang="en-US" baseline="0" dirty="0" err="1" smtClean="0"/>
+              <a:t>swt</a:t>
+            </a:r>
+            <a:r>
+              <a:rPr lang="en-US" baseline="0" dirty="0" smtClean="0"/>
+              <a:t>-chromium</a:t>
+            </a:r>
             <a:endParaRPr lang="en-US" dirty="0"/>
           </a:p>
         </p:txBody>
@@ -554,9 +571,9 @@
           <a:bodyPr/>
           <a:lstStyle/>
           <a:p>
-            <a:fld id="{D601B7DA-7173-45FE-94BD-29A6AF0F60C8}" type="slidenum">
+            <a:fld id="{37D84039-57F7-458C-B4DC-1BCA9EC66F49}" type="slidenum">
               <a:rPr lang="en-US" smtClean="0"/>
-              <a:t>4</a:t>
+              <a:t>1</a:t>
             </a:fld>
             <a:endParaRPr lang="en-US"/>
           </a:p>
@@ -565,7 +582,7 @@
     </p:spTree>
     <p:extLst>
       <p:ext uri="{BB962C8B-B14F-4D97-AF65-F5344CB8AC3E}">
-        <p14:creationId xmlns:p14="http://schemas.microsoft.com/office/powerpoint/2010/main" val="2156108430"/>
+        <p14:creationId xmlns:p14="http://schemas.microsoft.com/office/powerpoint/2010/main" val="3933495340"/>
       </p:ext>
     </p:extLst>
   </p:cSld>
@@ -640,7 +657,7 @@
           <a:p>
             <a:fld id="{D601B7DA-7173-45FE-94BD-29A6AF0F60C8}" type="slidenum">
               <a:rPr lang="en-US" smtClean="0"/>
-              <a:t>5</a:t>
+              <a:t>4</a:t>
             </a:fld>
             <a:endParaRPr lang="en-US"/>
           </a:p>
@@ -649,7 +666,7 @@
     </p:spTree>
     <p:extLst>
       <p:ext uri="{BB962C8B-B14F-4D97-AF65-F5344CB8AC3E}">
-        <p14:creationId xmlns:p14="http://schemas.microsoft.com/office/powerpoint/2010/main" val="2441152292"/>
+        <p14:creationId xmlns:p14="http://schemas.microsoft.com/office/powerpoint/2010/main" val="2156108430"/>
       </p:ext>
     </p:extLst>
   </p:cSld>
@@ -724,6 +741,90 @@
           <a:p>
             <a:fld id="{D601B7DA-7173-45FE-94BD-29A6AF0F60C8}" type="slidenum">
               <a:rPr lang="en-US" smtClean="0"/>
+              <a:t>5</a:t>
+            </a:fld>
+            <a:endParaRPr lang="en-US"/>
+          </a:p>
+        </p:txBody>
+      </p:sp>
+    </p:spTree>
+    <p:extLst>
+      <p:ext uri="{BB962C8B-B14F-4D97-AF65-F5344CB8AC3E}">
+        <p14:creationId xmlns:p14="http://schemas.microsoft.com/office/powerpoint/2010/main" val="2441152292"/>
+      </p:ext>
+    </p:extLst>
+  </p:cSld>
+  <p:clrMapOvr>
+    <a:masterClrMapping/>
+  </p:clrMapOvr>
+</p:notes>
+</file>
+
+<file path=ppt/notesSlides/notesSlide4.xml><?xml version="1.0" encoding="utf-8"?>
+<p:notes xmlns:a="http://schemas.openxmlformats.org/drawingml/2006/main" xmlns:r="http://schemas.openxmlformats.org/officeDocument/2006/relationships" xmlns:p="http://schemas.openxmlformats.org/presentationml/2006/main">
+  <p:cSld>
+    <p:spTree>
+      <p:nvGrpSpPr>
+        <p:cNvPr id="1" name=""/>
+        <p:cNvGrpSpPr/>
+        <p:nvPr/>
+      </p:nvGrpSpPr>
+      <p:grpSpPr>
+        <a:xfrm>
+          <a:off x="0" y="0"/>
+          <a:ext cx="0" cy="0"/>
+          <a:chOff x="0" y="0"/>
+          <a:chExt cx="0" cy="0"/>
+        </a:xfrm>
+      </p:grpSpPr>
+      <p:sp>
+        <p:nvSpPr>
+          <p:cNvPr id="2" name="Slide Image Placeholder 1"/>
+          <p:cNvSpPr>
+            <a:spLocks noGrp="1" noRot="1" noChangeAspect="1"/>
+          </p:cNvSpPr>
+          <p:nvPr>
+            <p:ph type="sldImg"/>
+          </p:nvPr>
+        </p:nvSpPr>
+        <p:spPr/>
+      </p:sp>
+      <p:sp>
+        <p:nvSpPr>
+          <p:cNvPr id="3" name="Notes Placeholder 2"/>
+          <p:cNvSpPr>
+            <a:spLocks noGrp="1"/>
+          </p:cNvSpPr>
+          <p:nvPr>
+            <p:ph type="body" idx="1"/>
+          </p:nvPr>
+        </p:nvSpPr>
+        <p:spPr/>
+        <p:txBody>
+          <a:bodyPr/>
+          <a:lstStyle/>
+          <a:p>
+            <a:endParaRPr lang="en-US" dirty="0"/>
+          </a:p>
+        </p:txBody>
+      </p:sp>
+      <p:sp>
+        <p:nvSpPr>
+          <p:cNvPr id="4" name="Slide Number Placeholder 3"/>
+          <p:cNvSpPr>
+            <a:spLocks noGrp="1"/>
+          </p:cNvSpPr>
+          <p:nvPr>
+            <p:ph type="sldNum" sz="quarter" idx="10"/>
+          </p:nvPr>
+        </p:nvSpPr>
+        <p:spPr/>
+        <p:txBody>
+          <a:bodyPr/>
+          <a:lstStyle/>
+          <a:p>
+            <a:fld id="{D601B7DA-7173-45FE-94BD-29A6AF0F60C8}" type="slidenum">
+              <a:rPr lang="en-US" smtClean="0"/>
               <a:t>6</a:t>
             </a:fld>
             <a:endParaRPr lang="en-US"/>
@@ -743,7 +844,7 @@
 </p:notes>
 </file>
 
-<file path=ppt/notesSlides/notesSlide4.xml><?xml version="1.0" encoding="utf-8"?>
+<file path=ppt/notesSlides/notesSlide5.xml><?xml version="1.0" encoding="utf-8"?>
 <p:notes xmlns:a="http://schemas.openxmlformats.org/drawingml/2006/main" xmlns:r="http://schemas.openxmlformats.org/officeDocument/2006/relationships" xmlns:p="http://schemas.openxmlformats.org/presentationml/2006/main" showMasterSp="0" showMasterPhAnim="0">
   <p:cSld>
     <p:spTree>
@@ -849,6 +950,106 @@
 </p:notes>
 </file>
 
+<file path=ppt/notesSlides/notesSlide6.xml><?xml version="1.0" encoding="utf-8"?>
+<p:notes xmlns:a="http://schemas.openxmlformats.org/drawingml/2006/main" xmlns:r="http://schemas.openxmlformats.org/officeDocument/2006/relationships" xmlns:p="http://schemas.openxmlformats.org/presentationml/2006/main">
+  <p:cSld>
+    <p:spTree>
+      <p:nvGrpSpPr>
+        <p:cNvPr id="1" name=""/>
+        <p:cNvGrpSpPr/>
+        <p:nvPr/>
+      </p:nvGrpSpPr>
+      <p:grpSpPr>
+        <a:xfrm>
+          <a:off x="0" y="0"/>
+          <a:ext cx="0" cy="0"/>
+          <a:chOff x="0" y="0"/>
+          <a:chExt cx="0" cy="0"/>
+        </a:xfrm>
+      </p:grpSpPr>
+      <p:sp>
+        <p:nvSpPr>
+          <p:cNvPr id="2" name="Slide Image Placeholder 1"/>
+          <p:cNvSpPr>
+            <a:spLocks noGrp="1" noRot="1" noChangeAspect="1"/>
+          </p:cNvSpPr>
+          <p:nvPr>
+            <p:ph type="sldImg"/>
+          </p:nvPr>
+        </p:nvSpPr>
+        <p:spPr/>
+      </p:sp>
+      <p:sp>
+        <p:nvSpPr>
+          <p:cNvPr id="3" name="Notes Placeholder 2"/>
+          <p:cNvSpPr>
+            <a:spLocks noGrp="1"/>
+          </p:cNvSpPr>
+          <p:nvPr>
+            <p:ph type="body" idx="1"/>
+          </p:nvPr>
+        </p:nvSpPr>
+        <p:spPr/>
+        <p:txBody>
+          <a:bodyPr/>
+          <a:lstStyle/>
+          <a:p>
+            <a:r>
+              <a:rPr lang="en-US" dirty="0" smtClean="0"/>
+              <a:t>SETUP:</a:t>
+            </a:r>
+            <a:r>
+              <a:rPr lang="en-US" baseline="0" dirty="0" smtClean="0"/>
+              <a:t> lsp4j and </a:t>
+            </a:r>
+            <a:r>
+              <a:rPr lang="en-US" baseline="0" dirty="0" err="1" smtClean="0"/>
+              <a:t>swt</a:t>
+            </a:r>
+            <a:r>
+              <a:rPr lang="en-US" baseline="0" dirty="0" smtClean="0"/>
+              <a:t>-chromium</a:t>
+            </a:r>
+            <a:endParaRPr lang="en-US" dirty="0"/>
+          </a:p>
+        </p:txBody>
+      </p:sp>
+      <p:sp>
+        <p:nvSpPr>
+          <p:cNvPr id="4" name="Slide Number Placeholder 3"/>
+          <p:cNvSpPr>
+            <a:spLocks noGrp="1"/>
+          </p:cNvSpPr>
+          <p:nvPr>
+            <p:ph type="sldNum" sz="quarter" idx="10"/>
+          </p:nvPr>
+        </p:nvSpPr>
+        <p:spPr/>
+        <p:txBody>
+          <a:bodyPr/>
+          <a:lstStyle/>
+          <a:p>
+            <a:fld id="{37D84039-57F7-458C-B4DC-1BCA9EC66F49}" type="slidenum">
+              <a:rPr lang="en-US" smtClean="0"/>
+              <a:t>26</a:t>
+            </a:fld>
+            <a:endParaRPr lang="en-US"/>
+          </a:p>
+        </p:txBody>
+      </p:sp>
+    </p:spTree>
+    <p:extLst>
+      <p:ext uri="{BB962C8B-B14F-4D97-AF65-F5344CB8AC3E}">
+        <p14:creationId xmlns:p14="http://schemas.microsoft.com/office/powerpoint/2010/main" val="3347973269"/>
+      </p:ext>
+    </p:extLst>
+  </p:cSld>
+  <p:clrMapOvr>
+    <a:masterClrMapping/>
+  </p:clrMapOvr>
+</p:notes>
+</file>
+
 <file path=ppt/slideLayouts/slideLayout1.xml><?xml version="1.0" encoding="utf-8"?>
 <p:sldLayout xmlns:a="http://schemas.openxmlformats.org/drawingml/2006/main" xmlns:r="http://schemas.openxmlformats.org/officeDocument/2006/relationships" xmlns:p="http://schemas.openxmlformats.org/presentationml/2006/main" type="title" preserve="1">
   <p:cSld name="Title Slide">
@@ -980,7 +1181,7 @@
           <a:p>
             <a:fld id="{B8966210-D7C8-4A1C-B59E-033C29288170}" type="datetimeFigureOut">
               <a:rPr lang="en-US" smtClean="0"/>
-              <a:t>3/15/2017</a:t>
+              <a:t>3/19/2017</a:t>
             </a:fld>
             <a:endParaRPr lang="en-US"/>
           </a:p>
@@ -1150,7 +1351,7 @@
           <a:p>
             <a:fld id="{B8966210-D7C8-4A1C-B59E-033C29288170}" type="datetimeFigureOut">
               <a:rPr lang="en-US" smtClean="0"/>
-              <a:t>3/15/2017</a:t>
+              <a:t>3/19/2017</a:t>
             </a:fld>
             <a:endParaRPr lang="en-US"/>
           </a:p>
@@ -1330,7 +1531,7 @@
           <a:p>
             <a:fld id="{B8966210-D7C8-4A1C-B59E-033C29288170}" type="datetimeFigureOut">
               <a:rPr lang="en-US" smtClean="0"/>
-              <a:t>3/15/2017</a:t>
+              <a:t>3/19/2017</a:t>
             </a:fld>
             <a:endParaRPr lang="en-US"/>
           </a:p>
@@ -3507,7 +3708,7 @@
           <a:p>
             <a:fld id="{B8966210-D7C8-4A1C-B59E-033C29288170}" type="datetimeFigureOut">
               <a:rPr lang="en-US" smtClean="0"/>
-              <a:t>3/15/2017</a:t>
+              <a:t>3/19/2017</a:t>
             </a:fld>
             <a:endParaRPr lang="en-US"/>
           </a:p>
@@ -4112,7 +4313,7 @@
                 </a:solidFill>
               </a:rPr>
               <a:pPr/>
-              <a:t>3/15/2017</a:t>
+              <a:t>3/19/2017</a:t>
             </a:fld>
             <a:endParaRPr lang="en-US">
               <a:solidFill>
@@ -4314,7 +4515,7 @@
                 </a:solidFill>
               </a:rPr>
               <a:pPr/>
-              <a:t>3/15/2017</a:t>
+              <a:t>3/19/2017</a:t>
             </a:fld>
             <a:endParaRPr lang="en-US">
               <a:solidFill>
@@ -4592,7 +4793,7 @@
                 </a:solidFill>
               </a:rPr>
               <a:pPr/>
-              <a:t>3/15/2017</a:t>
+              <a:t>3/19/2017</a:t>
             </a:fld>
             <a:endParaRPr lang="en-US">
               <a:solidFill>
@@ -4856,7 +5057,7 @@
                 </a:solidFill>
               </a:rPr>
               <a:pPr/>
-              <a:t>3/15/2017</a:t>
+              <a:t>3/19/2017</a:t>
             </a:fld>
             <a:endParaRPr lang="en-US">
               <a:solidFill>
@@ -5255,7 +5456,7 @@
                 </a:solidFill>
               </a:rPr>
               <a:pPr/>
-              <a:t>3/15/2017</a:t>
+              <a:t>3/19/2017</a:t>
             </a:fld>
             <a:endParaRPr lang="en-US">
               <a:solidFill>
@@ -5405,7 +5606,7 @@
                 </a:solidFill>
               </a:rPr>
               <a:pPr/>
-              <a:t>3/15/2017</a:t>
+              <a:t>3/19/2017</a:t>
             </a:fld>
             <a:endParaRPr lang="en-US">
               <a:solidFill>
@@ -5532,7 +5733,7 @@
                 </a:solidFill>
               </a:rPr>
               <a:pPr/>
-              <a:t>3/15/2017</a:t>
+              <a:t>3/19/2017</a:t>
             </a:fld>
             <a:endParaRPr lang="en-US">
               <a:solidFill>
@@ -5803,7 +6004,7 @@
           <a:p>
             <a:fld id="{B8966210-D7C8-4A1C-B59E-033C29288170}" type="datetimeFigureOut">
               <a:rPr lang="en-US" smtClean="0"/>
-              <a:t>3/15/2017</a:t>
+              <a:t>3/19/2017</a:t>
             </a:fld>
             <a:endParaRPr lang="en-US"/>
           </a:p>
@@ -6087,7 +6288,7 @@
                 </a:solidFill>
               </a:rPr>
               <a:pPr/>
-              <a:t>3/15/2017</a:t>
+              <a:t>3/19/2017</a:t>
             </a:fld>
             <a:endParaRPr lang="en-US">
               <a:solidFill>
@@ -6372,7 +6573,7 @@
                 </a:solidFill>
               </a:rPr>
               <a:pPr/>
-              <a:t>3/15/2017</a:t>
+              <a:t>3/19/2017</a:t>
             </a:fld>
             <a:endParaRPr lang="en-US">
               <a:solidFill>
@@ -6574,7 +6775,7 @@
                 </a:solidFill>
               </a:rPr>
               <a:pPr/>
-              <a:t>3/15/2017</a:t>
+              <a:t>3/19/2017</a:t>
             </a:fld>
             <a:endParaRPr lang="en-US">
               <a:solidFill>
@@ -6786,7 +6987,7 @@
                 </a:solidFill>
               </a:rPr>
               <a:pPr/>
-              <a:t>3/15/2017</a:t>
+              <a:t>3/19/2017</a:t>
             </a:fld>
             <a:endParaRPr lang="en-US">
               <a:solidFill>
@@ -7043,7 +7244,7 @@
           <a:p>
             <a:fld id="{B8966210-D7C8-4A1C-B59E-033C29288170}" type="datetimeFigureOut">
               <a:rPr lang="en-US" smtClean="0"/>
-              <a:t>3/15/2017</a:t>
+              <a:t>3/19/2017</a:t>
             </a:fld>
             <a:endParaRPr lang="en-US"/>
           </a:p>
@@ -7410,7 +7611,7 @@
           <a:p>
             <a:fld id="{B8966210-D7C8-4A1C-B59E-033C29288170}" type="datetimeFigureOut">
               <a:rPr lang="en-US" smtClean="0"/>
-              <a:t>3/15/2017</a:t>
+              <a:t>3/19/2017</a:t>
             </a:fld>
             <a:endParaRPr lang="en-US"/>
           </a:p>
@@ -7528,7 +7729,7 @@
           <a:p>
             <a:fld id="{B8966210-D7C8-4A1C-B59E-033C29288170}" type="datetimeFigureOut">
               <a:rPr lang="en-US" smtClean="0"/>
-              <a:t>3/15/2017</a:t>
+              <a:t>3/19/2017</a:t>
             </a:fld>
             <a:endParaRPr lang="en-US"/>
           </a:p>
@@ -7623,7 +7824,7 @@
           <a:p>
             <a:fld id="{B8966210-D7C8-4A1C-B59E-033C29288170}" type="datetimeFigureOut">
               <a:rPr lang="en-US" smtClean="0"/>
-              <a:t>3/15/2017</a:t>
+              <a:t>3/19/2017</a:t>
             </a:fld>
             <a:endParaRPr lang="en-US"/>
           </a:p>
@@ -7900,7 +8101,7 @@
           <a:p>
             <a:fld id="{B8966210-D7C8-4A1C-B59E-033C29288170}" type="datetimeFigureOut">
               <a:rPr lang="en-US" smtClean="0"/>
-              <a:t>3/15/2017</a:t>
+              <a:t>3/19/2017</a:t>
             </a:fld>
             <a:endParaRPr lang="en-US"/>
           </a:p>
@@ -8157,7 +8358,7 @@
           <a:p>
             <a:fld id="{B8966210-D7C8-4A1C-B59E-033C29288170}" type="datetimeFigureOut">
               <a:rPr lang="en-US" smtClean="0"/>
-              <a:t>3/15/2017</a:t>
+              <a:t>3/19/2017</a:t>
             </a:fld>
             <a:endParaRPr lang="en-US"/>
           </a:p>
@@ -8370,7 +8571,7 @@
           <a:p>
             <a:fld id="{B8966210-D7C8-4A1C-B59E-033C29288170}" type="datetimeFigureOut">
               <a:rPr lang="en-US" smtClean="0"/>
-              <a:t>3/15/2017</a:t>
+              <a:t>3/19/2017</a:t>
             </a:fld>
             <a:endParaRPr lang="en-US"/>
           </a:p>
@@ -10020,7 +10221,7 @@
                 </a:solidFill>
               </a:rPr>
               <a:pPr/>
-              <a:t>3/15/2017</a:t>
+              <a:t>3/19/2017</a:t>
             </a:fld>
             <a:endParaRPr lang="en-US">
               <a:solidFill>
@@ -10473,12 +10674,8 @@
           <a:lstStyle/>
           <a:p>
             <a:r>
-              <a:rPr lang="en-US" dirty="0" err="1" smtClean="0"/>
-              <a:t>Gradle</a:t>
-            </a:r>
-            <a:r>
               <a:rPr lang="en-US" dirty="0" smtClean="0"/>
-              <a:t> and Eclipse</a:t>
+              <a:t>Gradle and Eclipse</a:t>
             </a:r>
             <a:br>
               <a:rPr lang="en-US" dirty="0" smtClean="0"/>
@@ -10534,11 +10731,7 @@
           <a:p>
             <a:r>
               <a:rPr lang="en-US" sz="2400" dirty="0"/>
-              <a:t>Code examples </a:t>
-            </a:r>
-            <a:r>
-              <a:rPr lang="en-US" sz="2400" dirty="0"/>
-              <a:t>available here</a:t>
+              <a:t>Code examples available here</a:t>
             </a:r>
           </a:p>
         </p:txBody>
@@ -10589,7 +10782,7 @@
                 <a:solidFill>
                   <a:schemeClr val="accent1"/>
                 </a:solidFill>
-                <a:hlinkClick r:id="rId2"/>
+                <a:hlinkClick r:id="rId3"/>
               </a:rPr>
               <a:t>diffplug.com/</a:t>
             </a:r>
@@ -10598,7 +10791,7 @@
                 <a:solidFill>
                   <a:schemeClr val="accent1"/>
                 </a:solidFill>
-                <a:hlinkClick r:id="rId2"/>
+                <a:hlinkClick r:id="rId3"/>
               </a:rPr>
               <a:t>opensource</a:t>
             </a:r>
@@ -10647,7 +10840,7 @@
               <p:nvPr/>
             </p:nvPicPr>
             <p:blipFill>
-              <a:blip r:embed="rId3">
+              <a:blip r:embed="rId4">
                 <a:extLst>
                   <a:ext uri="{28A0092B-C50C-407E-A947-70E740481C1C}">
                     <a14:useLocalDpi xmlns:a14="http://schemas.microsoft.com/office/drawing/2010/main" val="0"/>
@@ -10767,7 +10960,7 @@
               <p:nvPr/>
             </p:nvPicPr>
             <p:blipFill>
-              <a:blip r:embed="rId4">
+              <a:blip r:embed="rId5">
                 <a:extLst>
                   <a:ext uri="{28A0092B-C50C-407E-A947-70E740481C1C}">
                     <a14:useLocalDpi xmlns:a14="http://schemas.microsoft.com/office/drawing/2010/main" val="0"/>
@@ -11061,8 +11254,10 @@
                 </a:solidFill>
                 <a:latin typeface="Consolas" panose="020B0609020204030204" pitchFamily="49" charset="0"/>
               </a:rPr>
-              <a:t> </a:t>
-            </a:r>
+              <a:t> {</a:t>
+            </a:r>
+          </a:p>
+          <a:p>
             <a:r>
               <a:rPr lang="en-US" sz="1400" dirty="0">
                 <a:solidFill>
@@ -11070,10 +11265,17 @@
                 </a:solidFill>
                 <a:latin typeface="Consolas" panose="020B0609020204030204" pitchFamily="49" charset="0"/>
               </a:rPr>
-              <a:t>{</a:t>
-            </a:r>
-          </a:p>
-          <a:p>
+              <a:t>    </a:t>
+            </a:r>
+            <a:r>
+              <a:rPr lang="en-US" sz="1400" dirty="0" err="1">
+                <a:solidFill>
+                  <a:srgbClr val="000000"/>
+                </a:solidFill>
+                <a:latin typeface="Consolas" panose="020B0609020204030204" pitchFamily="49" charset="0"/>
+              </a:rPr>
+              <a:t>repoEclipseLatest</a:t>
+            </a:r>
             <a:r>
               <a:rPr lang="en-US" sz="1400" dirty="0">
                 <a:solidFill>
@@ -11081,8 +11283,10 @@
                 </a:solidFill>
                 <a:latin typeface="Consolas" panose="020B0609020204030204" pitchFamily="49" charset="0"/>
               </a:rPr>
-              <a:t> </a:t>
-            </a:r>
+              <a:t>()</a:t>
+            </a:r>
+          </a:p>
+          <a:p>
             <a:r>
               <a:rPr lang="en-US" sz="1400" dirty="0">
                 <a:solidFill>
@@ -11090,7 +11294,7 @@
                 </a:solidFill>
                 <a:latin typeface="Consolas" panose="020B0609020204030204" pitchFamily="49" charset="0"/>
               </a:rPr>
-              <a:t>   </a:t>
+              <a:t>    </a:t>
             </a:r>
             <a:r>
               <a:rPr lang="en-US" sz="1400" dirty="0" err="1">
@@ -11099,7 +11303,7 @@
                 </a:solidFill>
                 <a:latin typeface="Consolas" panose="020B0609020204030204" pitchFamily="49" charset="0"/>
               </a:rPr>
-              <a:t>repoEclipseLatest</a:t>
+              <a:t>pde</a:t>
             </a:r>
             <a:r>
               <a:rPr lang="en-US" sz="1400" dirty="0">
@@ -11108,7 +11312,7 @@
                 </a:solidFill>
                 <a:latin typeface="Consolas" panose="020B0609020204030204" pitchFamily="49" charset="0"/>
               </a:rPr>
-              <a:t>()</a:t>
+              <a:t> {</a:t>
             </a:r>
           </a:p>
           <a:p>
@@ -11119,7 +11323,16 @@
                 </a:solidFill>
                 <a:latin typeface="Consolas" panose="020B0609020204030204" pitchFamily="49" charset="0"/>
               </a:rPr>
-              <a:t> </a:t>
+              <a:t>        </a:t>
+            </a:r>
+            <a:r>
+              <a:rPr lang="en-US" sz="1400" dirty="0" err="1">
+                <a:solidFill>
+                  <a:srgbClr val="000000"/>
+                </a:solidFill>
+                <a:latin typeface="Consolas" panose="020B0609020204030204" pitchFamily="49" charset="0"/>
+              </a:rPr>
+              <a:t>targetplatform</a:t>
             </a:r>
             <a:r>
               <a:rPr lang="en-US" sz="1400" dirty="0">
@@ -11128,83 +11341,18 @@
                 </a:solidFill>
                 <a:latin typeface="Consolas" panose="020B0609020204030204" pitchFamily="49" charset="0"/>
               </a:rPr>
-              <a:t>   </a:t>
-            </a:r>
-            <a:r>
-              <a:rPr lang="en-US" sz="1400" dirty="0" err="1">
+              <a:t> {</a:t>
+            </a:r>
+          </a:p>
+          <a:p>
+            <a:r>
+              <a:rPr lang="en-US" sz="1400" dirty="0">
                 <a:solidFill>
                   <a:srgbClr val="000000"/>
                 </a:solidFill>
                 <a:latin typeface="Consolas" panose="020B0609020204030204" pitchFamily="49" charset="0"/>
               </a:rPr>
-              <a:t>pde</a:t>
-            </a:r>
-            <a:r>
-              <a:rPr lang="en-US" sz="1400" dirty="0">
-                <a:solidFill>
-                  <a:srgbClr val="000000"/>
-                </a:solidFill>
-                <a:latin typeface="Consolas" panose="020B0609020204030204" pitchFamily="49" charset="0"/>
-              </a:rPr>
-              <a:t> {</a:t>
-            </a:r>
-          </a:p>
-          <a:p>
-            <a:r>
-              <a:rPr lang="en-US" sz="1400" dirty="0">
-                <a:solidFill>
-                  <a:srgbClr val="000000"/>
-                </a:solidFill>
-                <a:latin typeface="Consolas" panose="020B0609020204030204" pitchFamily="49" charset="0"/>
-              </a:rPr>
-              <a:t>        </a:t>
-            </a:r>
-            <a:r>
-              <a:rPr lang="en-US" sz="1400" dirty="0" err="1">
-                <a:solidFill>
-                  <a:srgbClr val="000000"/>
-                </a:solidFill>
-                <a:latin typeface="Consolas" panose="020B0609020204030204" pitchFamily="49" charset="0"/>
-              </a:rPr>
-              <a:t>targetplatform</a:t>
-            </a:r>
-            <a:r>
-              <a:rPr lang="en-US" sz="1400" dirty="0">
-                <a:solidFill>
-                  <a:srgbClr val="000000"/>
-                </a:solidFill>
-                <a:latin typeface="Consolas" panose="020B0609020204030204" pitchFamily="49" charset="0"/>
-              </a:rPr>
-              <a:t> </a:t>
-            </a:r>
-            <a:r>
-              <a:rPr lang="en-US" sz="1400" dirty="0">
-                <a:solidFill>
-                  <a:srgbClr val="000000"/>
-                </a:solidFill>
-                <a:latin typeface="Consolas" panose="020B0609020204030204" pitchFamily="49" charset="0"/>
-              </a:rPr>
-              <a:t>{</a:t>
-            </a:r>
-          </a:p>
-          <a:p>
-            <a:r>
-              <a:rPr lang="en-US" sz="1400" dirty="0">
-                <a:solidFill>
-                  <a:srgbClr val="000000"/>
-                </a:solidFill>
-                <a:latin typeface="Consolas" panose="020B0609020204030204" pitchFamily="49" charset="0"/>
-              </a:rPr>
-              <a:t>        </a:t>
-            </a:r>
-            <a:r>
-              <a:rPr lang="en-US" sz="1400" dirty="0">
-                <a:solidFill>
-                  <a:srgbClr val="000000"/>
-                </a:solidFill>
-                <a:latin typeface="Consolas" panose="020B0609020204030204" pitchFamily="49" charset="0"/>
-              </a:rPr>
-              <a:t>    installation </a:t>
+              <a:t>            installation </a:t>
             </a:r>
             <a:r>
               <a:rPr lang="en-US" sz="1400" dirty="0">
@@ -11268,12 +11416,6 @@
               </a:rPr>
               <a:t> </a:t>
             </a:r>
-            <a:endParaRPr lang="en-US" sz="1400" dirty="0">
-              <a:solidFill>
-                <a:srgbClr val="000000"/>
-              </a:solidFill>
-              <a:latin typeface="Consolas" panose="020B0609020204030204" pitchFamily="49" charset="0"/>
-            </a:endParaRPr>
           </a:p>
           <a:p>
             <a:r>
@@ -11283,8 +11425,10 @@
                 </a:solidFill>
                 <a:latin typeface="Consolas" panose="020B0609020204030204" pitchFamily="49" charset="0"/>
               </a:rPr>
-              <a:t>   </a:t>
-            </a:r>
+              <a:t>        }</a:t>
+            </a:r>
+          </a:p>
+          <a:p>
             <a:r>
               <a:rPr lang="en-US" sz="1400" dirty="0">
                 <a:solidFill>
@@ -11292,7 +11436,7 @@
                 </a:solidFill>
                 <a:latin typeface="Consolas" panose="020B0609020204030204" pitchFamily="49" charset="0"/>
               </a:rPr>
-              <a:t>     }</a:t>
+              <a:t>    }</a:t>
             </a:r>
           </a:p>
           <a:p>
@@ -11303,240 +11447,139 @@
                 </a:solidFill>
                 <a:latin typeface="Consolas" panose="020B0609020204030204" pitchFamily="49" charset="0"/>
               </a:rPr>
+              <a:t>    splash </a:t>
+            </a:r>
+            <a:r>
+              <a:rPr lang="en-US" sz="1400" dirty="0">
+                <a:solidFill>
+                  <a:srgbClr val="0000C0"/>
+                </a:solidFill>
+                <a:latin typeface="Consolas" panose="020B0609020204030204" pitchFamily="49" charset="0"/>
+              </a:rPr>
+              <a:t>'project_logo.png'</a:t>
+            </a:r>
+          </a:p>
+          <a:p>
+            <a:r>
+              <a:rPr lang="en-US" sz="1400" dirty="0">
+                <a:solidFill>
+                  <a:srgbClr val="0000C0"/>
+                </a:solidFill>
+                <a:latin typeface="Consolas" panose="020B0609020204030204" pitchFamily="49" charset="0"/>
+              </a:rPr>
+              <a:t>    </a:t>
+            </a:r>
+            <a:r>
+              <a:rPr lang="en-US" sz="1400" dirty="0">
+                <a:latin typeface="Consolas" panose="020B0609020204030204" pitchFamily="49" charset="0"/>
+              </a:rPr>
+              <a:t>style {</a:t>
+            </a:r>
+          </a:p>
+          <a:p>
+            <a:r>
+              <a:rPr lang="en-US" sz="1400" dirty="0">
+                <a:latin typeface="Consolas" panose="020B0609020204030204" pitchFamily="49" charset="0"/>
+              </a:rPr>
+              <a:t>        </a:t>
+            </a:r>
+            <a:r>
+              <a:rPr lang="en-US" sz="1400" dirty="0" err="1">
+                <a:latin typeface="Consolas" panose="020B0609020204030204" pitchFamily="49" charset="0"/>
+              </a:rPr>
+              <a:t>classicTheme</a:t>
+            </a:r>
+            <a:r>
+              <a:rPr lang="en-US" sz="1400" dirty="0">
+                <a:latin typeface="Consolas" panose="020B0609020204030204" pitchFamily="49" charset="0"/>
+              </a:rPr>
+              <a:t>()</a:t>
+            </a:r>
+          </a:p>
+          <a:p>
+            <a:r>
+              <a:rPr lang="en-US" sz="1400" dirty="0">
+                <a:latin typeface="Consolas" panose="020B0609020204030204" pitchFamily="49" charset="0"/>
+              </a:rPr>
+              <a:t>    }</a:t>
+            </a:r>
+          </a:p>
+          <a:p>
+            <a:r>
+              <a:rPr lang="en-US" sz="1400" dirty="0">
+                <a:solidFill>
+                  <a:srgbClr val="000000"/>
+                </a:solidFill>
+                <a:latin typeface="Consolas" panose="020B0609020204030204" pitchFamily="49" charset="0"/>
+              </a:rPr>
+              <a:t>    </a:t>
+            </a:r>
+            <a:r>
+              <a:rPr lang="en-US" sz="1400" dirty="0" err="1">
+                <a:solidFill>
+                  <a:srgbClr val="000000"/>
+                </a:solidFill>
+                <a:latin typeface="Consolas" panose="020B0609020204030204" pitchFamily="49" charset="0"/>
+              </a:rPr>
+              <a:t>eclipseIni</a:t>
+            </a:r>
+            <a:r>
+              <a:rPr lang="en-US" sz="1400" dirty="0">
+                <a:solidFill>
+                  <a:srgbClr val="000000"/>
+                </a:solidFill>
+                <a:latin typeface="Consolas" panose="020B0609020204030204" pitchFamily="49" charset="0"/>
+              </a:rPr>
+              <a:t> {</a:t>
+            </a:r>
+          </a:p>
+          <a:p>
+            <a:r>
+              <a:rPr lang="en-US" sz="1400" dirty="0">
+                <a:solidFill>
+                  <a:srgbClr val="000000"/>
+                </a:solidFill>
+                <a:latin typeface="Consolas" panose="020B0609020204030204" pitchFamily="49" charset="0"/>
+              </a:rPr>
+              <a:t>        </a:t>
+            </a:r>
+            <a:r>
+              <a:rPr lang="en-US" sz="1400" dirty="0" err="1">
+                <a:solidFill>
+                  <a:srgbClr val="000000"/>
+                </a:solidFill>
+                <a:latin typeface="Consolas" panose="020B0609020204030204" pitchFamily="49" charset="0"/>
+              </a:rPr>
+              <a:t>vmargs</a:t>
+            </a:r>
+            <a:r>
+              <a:rPr lang="en-US" sz="1400" dirty="0">
+                <a:solidFill>
+                  <a:srgbClr val="000000"/>
+                </a:solidFill>
+                <a:latin typeface="Consolas" panose="020B0609020204030204" pitchFamily="49" charset="0"/>
+              </a:rPr>
               <a:t> </a:t>
             </a:r>
             <a:r>
               <a:rPr lang="en-US" sz="1400" dirty="0">
                 <a:solidFill>
+                  <a:srgbClr val="0000C0"/>
+                </a:solidFill>
+                <a:latin typeface="Consolas" panose="020B0609020204030204" pitchFamily="49" charset="0"/>
+              </a:rPr>
+              <a:t>'-Xmx2g'</a:t>
+            </a:r>
+          </a:p>
+          <a:p>
+            <a:r>
+              <a:rPr lang="en-US" sz="1400" dirty="0">
+                <a:solidFill>
                   <a:srgbClr val="000000"/>
                 </a:solidFill>
                 <a:latin typeface="Consolas" panose="020B0609020204030204" pitchFamily="49" charset="0"/>
               </a:rPr>
-              <a:t>   }</a:t>
-            </a:r>
-          </a:p>
-          <a:p>
-            <a:r>
-              <a:rPr lang="en-US" sz="1400" dirty="0">
-                <a:solidFill>
-                  <a:srgbClr val="000000"/>
-                </a:solidFill>
-                <a:latin typeface="Consolas" panose="020B0609020204030204" pitchFamily="49" charset="0"/>
-              </a:rPr>
-              <a:t>    splash </a:t>
-            </a:r>
-            <a:r>
-              <a:rPr lang="en-US" sz="1400" dirty="0">
-                <a:solidFill>
-                  <a:srgbClr val="0000C0"/>
-                </a:solidFill>
-                <a:latin typeface="Consolas" panose="020B0609020204030204" pitchFamily="49" charset="0"/>
-              </a:rPr>
-              <a:t>'project_logo.png</a:t>
-            </a:r>
-            <a:r>
-              <a:rPr lang="en-US" sz="1400" dirty="0">
-                <a:solidFill>
-                  <a:srgbClr val="0000C0"/>
-                </a:solidFill>
-                <a:latin typeface="Consolas" panose="020B0609020204030204" pitchFamily="49" charset="0"/>
-              </a:rPr>
-              <a:t>'</a:t>
-            </a:r>
-            <a:endParaRPr lang="en-US" sz="1400" dirty="0">
-              <a:solidFill>
-                <a:srgbClr val="0000C0"/>
-              </a:solidFill>
-              <a:latin typeface="Consolas" panose="020B0609020204030204" pitchFamily="49" charset="0"/>
-            </a:endParaRPr>
-          </a:p>
-          <a:p>
-            <a:r>
-              <a:rPr lang="en-US" sz="1400" dirty="0">
-                <a:solidFill>
-                  <a:srgbClr val="0000C0"/>
-                </a:solidFill>
-                <a:latin typeface="Consolas" panose="020B0609020204030204" pitchFamily="49" charset="0"/>
-              </a:rPr>
-              <a:t> </a:t>
-            </a:r>
-            <a:r>
-              <a:rPr lang="en-US" sz="1400" dirty="0">
-                <a:solidFill>
-                  <a:srgbClr val="0000C0"/>
-                </a:solidFill>
-                <a:latin typeface="Consolas" panose="020B0609020204030204" pitchFamily="49" charset="0"/>
-              </a:rPr>
-              <a:t>   </a:t>
-            </a:r>
-            <a:r>
-              <a:rPr lang="en-US" sz="1400" dirty="0">
-                <a:latin typeface="Consolas" panose="020B0609020204030204" pitchFamily="49" charset="0"/>
-              </a:rPr>
-              <a:t>style {</a:t>
-            </a:r>
-          </a:p>
-          <a:p>
-            <a:r>
-              <a:rPr lang="en-US" sz="1400" dirty="0">
-                <a:latin typeface="Consolas" panose="020B0609020204030204" pitchFamily="49" charset="0"/>
-              </a:rPr>
-              <a:t> </a:t>
-            </a:r>
-            <a:r>
-              <a:rPr lang="en-US" sz="1400" dirty="0">
-                <a:latin typeface="Consolas" panose="020B0609020204030204" pitchFamily="49" charset="0"/>
-              </a:rPr>
-              <a:t>       </a:t>
-            </a:r>
-            <a:r>
-              <a:rPr lang="en-US" sz="1400" dirty="0" err="1">
-                <a:latin typeface="Consolas" panose="020B0609020204030204" pitchFamily="49" charset="0"/>
-              </a:rPr>
-              <a:t>classicTheme</a:t>
-            </a:r>
-            <a:r>
-              <a:rPr lang="en-US" sz="1400" dirty="0">
-                <a:latin typeface="Consolas" panose="020B0609020204030204" pitchFamily="49" charset="0"/>
-              </a:rPr>
-              <a:t>()</a:t>
-            </a:r>
-          </a:p>
-          <a:p>
-            <a:r>
-              <a:rPr lang="en-US" sz="1400" dirty="0">
-                <a:latin typeface="Consolas" panose="020B0609020204030204" pitchFamily="49" charset="0"/>
-              </a:rPr>
-              <a:t>    }</a:t>
-            </a:r>
-          </a:p>
-          <a:p>
-            <a:r>
-              <a:rPr lang="en-US" sz="1400" dirty="0">
-                <a:solidFill>
-                  <a:srgbClr val="000000"/>
-                </a:solidFill>
-                <a:latin typeface="Consolas" panose="020B0609020204030204" pitchFamily="49" charset="0"/>
-              </a:rPr>
-              <a:t> </a:t>
-            </a:r>
-            <a:r>
-              <a:rPr lang="en-US" sz="1400" dirty="0">
-                <a:solidFill>
-                  <a:srgbClr val="000000"/>
-                </a:solidFill>
-                <a:latin typeface="Consolas" panose="020B0609020204030204" pitchFamily="49" charset="0"/>
-              </a:rPr>
-              <a:t>   </a:t>
-            </a:r>
-            <a:r>
-              <a:rPr lang="en-US" sz="1400" dirty="0" err="1">
-                <a:solidFill>
-                  <a:srgbClr val="000000"/>
-                </a:solidFill>
-                <a:latin typeface="Consolas" panose="020B0609020204030204" pitchFamily="49" charset="0"/>
-              </a:rPr>
-              <a:t>eclipseIni</a:t>
-            </a:r>
-            <a:r>
-              <a:rPr lang="en-US" sz="1400" dirty="0">
-                <a:solidFill>
-                  <a:srgbClr val="000000"/>
-                </a:solidFill>
-                <a:latin typeface="Consolas" panose="020B0609020204030204" pitchFamily="49" charset="0"/>
-              </a:rPr>
-              <a:t> {</a:t>
-            </a:r>
-          </a:p>
-          <a:p>
-            <a:r>
-              <a:rPr lang="en-US" sz="1400" dirty="0">
-                <a:solidFill>
-                  <a:srgbClr val="000000"/>
-                </a:solidFill>
-                <a:latin typeface="Consolas" panose="020B0609020204030204" pitchFamily="49" charset="0"/>
-              </a:rPr>
-              <a:t> </a:t>
-            </a:r>
-            <a:r>
-              <a:rPr lang="en-US" sz="1400" dirty="0">
-                <a:solidFill>
-                  <a:srgbClr val="000000"/>
-                </a:solidFill>
-                <a:latin typeface="Consolas" panose="020B0609020204030204" pitchFamily="49" charset="0"/>
-              </a:rPr>
-              <a:t>       </a:t>
-            </a:r>
-            <a:r>
-              <a:rPr lang="en-US" sz="1400" dirty="0" err="1">
-                <a:solidFill>
-                  <a:srgbClr val="000000"/>
-                </a:solidFill>
-                <a:latin typeface="Consolas" panose="020B0609020204030204" pitchFamily="49" charset="0"/>
-              </a:rPr>
-              <a:t>vmargs</a:t>
-            </a:r>
-            <a:r>
-              <a:rPr lang="en-US" sz="1400" dirty="0">
-                <a:solidFill>
-                  <a:srgbClr val="000000"/>
-                </a:solidFill>
-                <a:latin typeface="Consolas" panose="020B0609020204030204" pitchFamily="49" charset="0"/>
-              </a:rPr>
-              <a:t> </a:t>
-            </a:r>
-            <a:r>
-              <a:rPr lang="en-US" sz="1400" dirty="0">
-                <a:solidFill>
-                  <a:srgbClr val="0000C0"/>
-                </a:solidFill>
-                <a:latin typeface="Consolas" panose="020B0609020204030204" pitchFamily="49" charset="0"/>
-              </a:rPr>
-              <a:t>'</a:t>
-            </a:r>
-            <a:r>
-              <a:rPr lang="en-US" sz="1400" dirty="0">
-                <a:solidFill>
-                  <a:srgbClr val="0000C0"/>
-                </a:solidFill>
-                <a:latin typeface="Consolas" panose="020B0609020204030204" pitchFamily="49" charset="0"/>
-              </a:rPr>
-              <a:t>-Xmx2g</a:t>
-            </a:r>
-            <a:r>
-              <a:rPr lang="en-US" sz="1400" dirty="0">
-                <a:solidFill>
-                  <a:srgbClr val="0000C0"/>
-                </a:solidFill>
-                <a:latin typeface="Consolas" panose="020B0609020204030204" pitchFamily="49" charset="0"/>
-              </a:rPr>
-              <a:t>'</a:t>
-            </a:r>
-            <a:endParaRPr lang="en-US" sz="1400" dirty="0">
-              <a:solidFill>
-                <a:srgbClr val="0000C0"/>
-              </a:solidFill>
-              <a:latin typeface="Consolas" panose="020B0609020204030204" pitchFamily="49" charset="0"/>
-            </a:endParaRPr>
-          </a:p>
-          <a:p>
-            <a:r>
-              <a:rPr lang="en-US" sz="1400" dirty="0">
-                <a:solidFill>
-                  <a:srgbClr val="000000"/>
-                </a:solidFill>
-                <a:latin typeface="Consolas" panose="020B0609020204030204" pitchFamily="49" charset="0"/>
-              </a:rPr>
-              <a:t> </a:t>
-            </a:r>
-            <a:r>
-              <a:rPr lang="en-US" sz="1400" dirty="0">
-                <a:solidFill>
-                  <a:srgbClr val="000000"/>
-                </a:solidFill>
-                <a:latin typeface="Consolas" panose="020B0609020204030204" pitchFamily="49" charset="0"/>
-              </a:rPr>
-              <a:t>   </a:t>
+              <a:t>    </a:t>
             </a:r>
             <a:r>
               <a:rPr lang="en-US" sz="1400" dirty="0" smtClean="0">
@@ -12221,22 +12264,14 @@
           <a:lstStyle/>
           <a:p>
             <a:r>
-              <a:rPr lang="en-US" dirty="0" err="1" smtClean="0"/>
-              <a:t>Gradle</a:t>
-            </a:r>
-            <a:r>
               <a:rPr lang="en-US" dirty="0" smtClean="0"/>
-              <a:t> vs Maven</a:t>
-            </a:r>
-          </a:p>
-          <a:p>
-            <a:r>
-              <a:rPr lang="en-US" dirty="0" err="1" smtClean="0"/>
-              <a:t>Gradle</a:t>
-            </a:r>
+              <a:t>Gradle vs Maven</a:t>
+            </a:r>
+          </a:p>
+          <a:p>
             <a:r>
               <a:rPr lang="en-US" dirty="0" smtClean="0"/>
-              <a:t> as an adoption vector for Eclipse IDE</a:t>
+              <a:t>Gradle as an adoption vector for Eclipse IDE</a:t>
             </a:r>
           </a:p>
           <a:p>
@@ -12249,12 +12284,8 @@
           </a:p>
           <a:p>
             <a:r>
-              <a:rPr lang="en-US" b="1" dirty="0" err="1" smtClean="0"/>
-              <a:t>Gradle</a:t>
-            </a:r>
-            <a:r>
               <a:rPr lang="en-US" b="1" dirty="0" smtClean="0"/>
-              <a:t> as an adoption vector for Eclipse components (</a:t>
+              <a:t>Gradle as an adoption vector for Eclipse components (</a:t>
             </a:r>
             <a:r>
               <a:rPr lang="en-US" b="1" dirty="0" err="1" smtClean="0"/>
@@ -12281,15 +12312,7 @@
             </a:r>
             <a:r>
               <a:rPr lang="en-US" b="1" dirty="0"/>
-              <a:t>is p2 hard in </a:t>
-            </a:r>
-            <a:r>
-              <a:rPr lang="en-US" b="1" dirty="0" err="1"/>
-              <a:t>Gradle</a:t>
-            </a:r>
-            <a:r>
-              <a:rPr lang="en-US" b="1" dirty="0"/>
-              <a:t>?</a:t>
+              <a:t>is p2 hard in Gradle?</a:t>
             </a:r>
           </a:p>
           <a:p>
@@ -12301,12 +12324,8 @@
           </a:p>
           <a:p>
             <a:r>
-              <a:rPr lang="en-US" dirty="0" err="1" smtClean="0"/>
-              <a:t>Gradle</a:t>
-            </a:r>
-            <a:r>
               <a:rPr lang="en-US" dirty="0" smtClean="0"/>
-              <a:t> for Eclipse developers</a:t>
+              <a:t>Gradle for Eclipse developers</a:t>
             </a:r>
           </a:p>
           <a:p>
@@ -12939,11 +12958,7 @@
             </a:r>
             <a:r>
               <a:rPr lang="en-US" dirty="0" smtClean="0"/>
-              <a:t>onsume deps from </a:t>
-            </a:r>
-            <a:r>
-              <a:rPr lang="en-US" dirty="0" smtClean="0"/>
-              <a:t>p2 in </a:t>
+              <a:t>onsume deps from p2 in </a:t>
             </a:r>
             <a:r>
               <a:rPr lang="en-US" dirty="0" err="1" smtClean="0"/>
@@ -13008,15 +13023,7 @@
             </a:r>
             <a:r>
               <a:rPr lang="en-US" dirty="0" smtClean="0"/>
-              <a:t> is close (requires </a:t>
-            </a:r>
-            <a:r>
-              <a:rPr lang="en-US" dirty="0" err="1" smtClean="0"/>
-              <a:t>Gradle</a:t>
-            </a:r>
-            <a:r>
-              <a:rPr lang="en-US" dirty="0" smtClean="0"/>
-              <a:t> &lt; 2.8)</a:t>
+              <a:t> is close (requires Gradle &lt; 2.8)</a:t>
             </a:r>
           </a:p>
           <a:p>
@@ -13033,36 +13040,15 @@
             </a:r>
             <a:r>
               <a:rPr lang="en-US" dirty="0" smtClean="0"/>
-              <a:t> of </a:t>
-            </a:r>
-            <a:r>
-              <a:rPr lang="en-US" dirty="0" err="1" smtClean="0"/>
-              <a:t>Gradle</a:t>
-            </a:r>
+              <a:t> of Gradle 2.13 with p2 support</a:t>
+            </a:r>
+          </a:p>
+          <a:p>
+            <a:pPr lvl="1"/>
             <a:r>
               <a:rPr lang="en-US" dirty="0" smtClean="0"/>
-              <a:t> 2.13 with p2 support</a:t>
-            </a:r>
-          </a:p>
-          <a:p>
-            <a:pPr lvl="1"/>
-            <a:r>
-              <a:rPr lang="en-US" dirty="0" err="1" smtClean="0"/>
-              <a:t>Gradle</a:t>
-            </a:r>
-            <a:r>
-              <a:rPr lang="en-US" dirty="0" smtClean="0"/>
-              <a:t> doesn’t have a p</a:t>
-            </a:r>
-            <a:r>
-              <a:rPr lang="en-US" dirty="0" smtClean="0"/>
-              <a:t>ublic </a:t>
-            </a:r>
-            <a:r>
-              <a:rPr lang="en-US" dirty="0" smtClean="0"/>
-              <a:t>repository API: </a:t>
-            </a:r>
-            <a:endParaRPr lang="en-US" dirty="0" smtClean="0"/>
+              <a:t>Gradle doesn’t have a public repository API: </a:t>
+            </a:r>
           </a:p>
           <a:p>
             <a:pPr lvl="2"/>
@@ -13111,11 +13097,7 @@
           <a:p>
             <a:r>
               <a:rPr lang="en-US" dirty="0" smtClean="0"/>
-              <a:t>Workaround </a:t>
-            </a:r>
-            <a:r>
-              <a:rPr lang="en-US" dirty="0" smtClean="0"/>
-              <a:t>– turn p2 repository into a maven repository</a:t>
+              <a:t>Workaround – turn p2 repository into a maven repository</a:t>
             </a:r>
           </a:p>
           <a:p>
@@ -13859,7 +13841,6 @@
               <a:rPr lang="en-US" dirty="0"/>
               <a:t>Guava</a:t>
             </a:r>
-            <a:endParaRPr lang="en-US" dirty="0"/>
           </a:p>
         </p:txBody>
       </p:sp>
@@ -15413,22 +15394,14 @@
           <a:lstStyle/>
           <a:p>
             <a:r>
-              <a:rPr lang="en-US" dirty="0" err="1" smtClean="0"/>
-              <a:t>Gradle</a:t>
-            </a:r>
-            <a:r>
               <a:rPr lang="en-US" dirty="0" smtClean="0"/>
-              <a:t> vs Maven</a:t>
-            </a:r>
-          </a:p>
-          <a:p>
-            <a:r>
-              <a:rPr lang="en-US" dirty="0" err="1" smtClean="0"/>
-              <a:t>Gradle</a:t>
-            </a:r>
+              <a:t>Gradle vs Maven</a:t>
+            </a:r>
+          </a:p>
+          <a:p>
             <a:r>
               <a:rPr lang="en-US" dirty="0" smtClean="0"/>
-              <a:t> as an adoption vector for Eclipse IDE</a:t>
+              <a:t>Gradle as an adoption vector for Eclipse IDE</a:t>
             </a:r>
           </a:p>
           <a:p>
@@ -15441,12 +15414,8 @@
           </a:p>
           <a:p>
             <a:r>
-              <a:rPr lang="en-US" dirty="0" err="1" smtClean="0"/>
-              <a:t>Gradle</a:t>
-            </a:r>
-            <a:r>
               <a:rPr lang="en-US" dirty="0" smtClean="0"/>
-              <a:t> as an adoption vector for Eclipse components (</a:t>
+              <a:t>Gradle as an adoption vector for Eclipse components (</a:t>
             </a:r>
             <a:r>
               <a:rPr lang="en-US" dirty="0" err="1" smtClean="0"/>
@@ -15473,15 +15442,7 @@
             </a:r>
             <a:r>
               <a:rPr lang="en-US" dirty="0"/>
-              <a:t>is p2 hard in </a:t>
-            </a:r>
-            <a:r>
-              <a:rPr lang="en-US" dirty="0" err="1"/>
-              <a:t>Gradle</a:t>
-            </a:r>
-            <a:r>
-              <a:rPr lang="en-US" dirty="0"/>
-              <a:t>?</a:t>
+              <a:t>is p2 hard in Gradle?</a:t>
             </a:r>
           </a:p>
           <a:p>
@@ -15493,12 +15454,8 @@
           </a:p>
           <a:p>
             <a:r>
-              <a:rPr lang="en-US" b="1" dirty="0" err="1" smtClean="0"/>
-              <a:t>Gradle</a:t>
-            </a:r>
-            <a:r>
               <a:rPr lang="en-US" b="1" dirty="0" smtClean="0"/>
-              <a:t> for Eclipse developers</a:t>
+              <a:t>Gradle for Eclipse developers</a:t>
             </a:r>
           </a:p>
           <a:p>
@@ -16576,22 +16533,14 @@
           <a:lstStyle/>
           <a:p>
             <a:r>
-              <a:rPr lang="en-US" dirty="0" err="1" smtClean="0"/>
-              <a:t>Gradle</a:t>
-            </a:r>
-            <a:r>
               <a:rPr lang="en-US" dirty="0" smtClean="0"/>
-              <a:t> vs Maven</a:t>
-            </a:r>
-          </a:p>
-          <a:p>
-            <a:r>
-              <a:rPr lang="en-US" dirty="0" err="1"/>
-              <a:t>Gradle</a:t>
-            </a:r>
+              <a:t>Gradle vs Maven</a:t>
+            </a:r>
+          </a:p>
+          <a:p>
             <a:r>
               <a:rPr lang="en-US" dirty="0"/>
-              <a:t> as an adoption vector for Eclipse IDE</a:t>
+              <a:t>Gradle as an adoption vector for Eclipse IDE</a:t>
             </a:r>
           </a:p>
           <a:p>
@@ -16604,12 +16553,8 @@
           </a:p>
           <a:p>
             <a:r>
-              <a:rPr lang="en-US" dirty="0" err="1" smtClean="0"/>
-              <a:t>Gradle</a:t>
-            </a:r>
-            <a:r>
               <a:rPr lang="en-US" dirty="0" smtClean="0"/>
-              <a:t> as a contributor vector for Eclipse components (</a:t>
+              <a:t>Gradle as a contributor vector for Eclipse components (</a:t>
             </a:r>
             <a:r>
               <a:rPr lang="en-US" dirty="0" err="1" smtClean="0"/>
@@ -16636,15 +16581,7 @@
             </a:r>
             <a:r>
               <a:rPr lang="en-US" dirty="0"/>
-              <a:t>is p2 hard in </a:t>
-            </a:r>
-            <a:r>
-              <a:rPr lang="en-US" dirty="0" err="1"/>
-              <a:t>Gradle</a:t>
-            </a:r>
-            <a:r>
-              <a:rPr lang="en-US" dirty="0"/>
-              <a:t>?</a:t>
+              <a:t>is p2 hard in Gradle?</a:t>
             </a:r>
           </a:p>
           <a:p>
@@ -16660,12 +16597,8 @@
           </a:p>
           <a:p>
             <a:r>
-              <a:rPr lang="en-US" dirty="0" err="1" smtClean="0"/>
-              <a:t>Gradle</a:t>
-            </a:r>
-            <a:r>
               <a:rPr lang="en-US" dirty="0" smtClean="0"/>
-              <a:t> for Eclipse developers</a:t>
+              <a:t>Gradle for Eclipse developers</a:t>
             </a:r>
           </a:p>
           <a:p>
@@ -17605,16 +17538,7 @@
                 </a:solidFill>
                 <a:latin typeface="Consolas" panose="020B0609020204030204" pitchFamily="49" charset="0"/>
               </a:rPr>
-              <a:t>    'Import-Package</a:t>
-            </a:r>
-            <a:r>
-              <a:rPr lang="en-US" dirty="0">
-                <a:solidFill>
-                  <a:srgbClr val="0000C0"/>
-                </a:solidFill>
-                <a:latin typeface="Consolas" panose="020B0609020204030204" pitchFamily="49" charset="0"/>
-              </a:rPr>
-              <a:t>'</a:t>
+              <a:t>    'Import-Package'</a:t>
             </a:r>
             <a:r>
               <a:rPr lang="en-US" dirty="0">
@@ -19447,8 +19371,10 @@
                 </a:solidFill>
                 <a:latin typeface="Consolas" panose="020B0609020204030204" pitchFamily="49" charset="0"/>
               </a:rPr>
-              <a:t> </a:t>
-            </a:r>
+              <a:t>    // and where they will go</a:t>
+            </a:r>
+          </a:p>
+          <a:p>
             <a:r>
               <a:rPr lang="en-US" sz="1300" dirty="0">
                 <a:solidFill>
@@ -19456,7 +19382,7 @@
                 </a:solidFill>
                 <a:latin typeface="Consolas" panose="020B0609020204030204" pitchFamily="49" charset="0"/>
               </a:rPr>
-              <a:t>   // and where they will go</a:t>
+              <a:t>    destination(P2_DIR)</a:t>
             </a:r>
           </a:p>
           <a:p>
@@ -19467,7 +19393,7 @@
                 </a:solidFill>
                 <a:latin typeface="Consolas" panose="020B0609020204030204" pitchFamily="49" charset="0"/>
               </a:rPr>
-              <a:t>    destination(P2_DIR)</a:t>
+              <a:t>    // specify that this is a product build</a:t>
             </a:r>
           </a:p>
           <a:p>
@@ -19478,7 +19404,7 @@
                 </a:solidFill>
                 <a:latin typeface="Consolas" panose="020B0609020204030204" pitchFamily="49" charset="0"/>
               </a:rPr>
-              <a:t>    // specify that this is a product build</a:t>
+              <a:t>    product {</a:t>
             </a:r>
           </a:p>
           <a:p>
@@ -19489,74 +19415,45 @@
                 </a:solidFill>
                 <a:latin typeface="Consolas" panose="020B0609020204030204" pitchFamily="49" charset="0"/>
               </a:rPr>
-              <a:t>    product {</a:t>
-            </a:r>
-          </a:p>
-          <a:p>
+              <a:t>        id </a:t>
+            </a:r>
             <a:r>
               <a:rPr lang="en-US" sz="1300" dirty="0">
                 <a:solidFill>
+                  <a:srgbClr val="0000C0"/>
+                </a:solidFill>
+                <a:latin typeface="Consolas" panose="020B0609020204030204" pitchFamily="49" charset="0"/>
+              </a:rPr>
+              <a:t>'</a:t>
+            </a:r>
+            <a:r>
+              <a:rPr lang="en-US" sz="1300" dirty="0" err="1">
+                <a:solidFill>
+                  <a:srgbClr val="0000C0"/>
+                </a:solidFill>
+                <a:latin typeface="Consolas" panose="020B0609020204030204" pitchFamily="49" charset="0"/>
+              </a:rPr>
+              <a:t>com.diffplug.rcpdemo.product</a:t>
+            </a:r>
+            <a:r>
+              <a:rPr lang="en-US" sz="1300" dirty="0">
+                <a:solidFill>
+                  <a:srgbClr val="0000C0"/>
+                </a:solidFill>
+                <a:latin typeface="Consolas" panose="020B0609020204030204" pitchFamily="49" charset="0"/>
+              </a:rPr>
+              <a:t>'</a:t>
+            </a:r>
+          </a:p>
+          <a:p>
+            <a:r>
+              <a:rPr lang="en-US" sz="1300" dirty="0">
+                <a:solidFill>
                   <a:srgbClr val="000000"/>
                 </a:solidFill>
                 <a:latin typeface="Consolas" panose="020B0609020204030204" pitchFamily="49" charset="0"/>
               </a:rPr>
-              <a:t> </a:t>
-            </a:r>
-            <a:r>
-              <a:rPr lang="en-US" sz="1300" dirty="0">
-                <a:solidFill>
-                  <a:srgbClr val="000000"/>
-                </a:solidFill>
-                <a:latin typeface="Consolas" panose="020B0609020204030204" pitchFamily="49" charset="0"/>
-              </a:rPr>
-              <a:t>       id </a:t>
-            </a:r>
-            <a:r>
-              <a:rPr lang="en-US" sz="1300" dirty="0">
-                <a:solidFill>
-                  <a:srgbClr val="0000C0"/>
-                </a:solidFill>
-                <a:latin typeface="Consolas" panose="020B0609020204030204" pitchFamily="49" charset="0"/>
-              </a:rPr>
-              <a:t>'</a:t>
-            </a:r>
-            <a:r>
-              <a:rPr lang="en-US" sz="1300" dirty="0" err="1">
-                <a:solidFill>
-                  <a:srgbClr val="0000C0"/>
-                </a:solidFill>
-                <a:latin typeface="Consolas" panose="020B0609020204030204" pitchFamily="49" charset="0"/>
-              </a:rPr>
-              <a:t>com.diffplug.rcpdemo.product</a:t>
-            </a:r>
-            <a:r>
-              <a:rPr lang="en-US" sz="1300" dirty="0">
-                <a:solidFill>
-                  <a:srgbClr val="0000C0"/>
-                </a:solidFill>
-                <a:latin typeface="Consolas" panose="020B0609020204030204" pitchFamily="49" charset="0"/>
-              </a:rPr>
-              <a:t>'</a:t>
-            </a:r>
-          </a:p>
-          <a:p>
-            <a:r>
-              <a:rPr lang="en-US" sz="1300" dirty="0">
-                <a:solidFill>
-                  <a:srgbClr val="000000"/>
-                </a:solidFill>
-                <a:latin typeface="Consolas" panose="020B0609020204030204" pitchFamily="49" charset="0"/>
-              </a:rPr>
-              <a:t> </a:t>
-            </a:r>
-            <a:r>
-              <a:rPr lang="en-US" sz="1300" dirty="0">
-                <a:solidFill>
-                  <a:srgbClr val="000000"/>
-                </a:solidFill>
-                <a:latin typeface="Consolas" panose="020B0609020204030204" pitchFamily="49" charset="0"/>
-              </a:rPr>
-              <a:t>       version </a:t>
+              <a:t>        version </a:t>
             </a:r>
             <a:r>
               <a:rPr lang="en-US" sz="1300" dirty="0" err="1">
@@ -19582,26 +19479,82 @@
                 </a:solidFill>
                 <a:latin typeface="Consolas" panose="020B0609020204030204" pitchFamily="49" charset="0"/>
               </a:rPr>
+              <a:t>        </a:t>
+            </a:r>
+            <a:r>
+              <a:rPr lang="en-US" sz="1300" dirty="0" err="1">
+                <a:solidFill>
+                  <a:srgbClr val="000000"/>
+                </a:solidFill>
+                <a:latin typeface="Consolas" panose="020B0609020204030204" pitchFamily="49" charset="0"/>
+              </a:rPr>
+              <a:t>productPluginDir</a:t>
+            </a:r>
+            <a:r>
+              <a:rPr lang="en-US" sz="1300" dirty="0">
+                <a:solidFill>
+                  <a:srgbClr val="000000"/>
+                </a:solidFill>
+                <a:latin typeface="Consolas" panose="020B0609020204030204" pitchFamily="49" charset="0"/>
+              </a:rPr>
               <a:t> </a:t>
             </a:r>
             <a:r>
+              <a:rPr lang="en-US" sz="1300" dirty="0" err="1">
+                <a:solidFill>
+                  <a:srgbClr val="000000"/>
+                </a:solidFill>
+                <a:latin typeface="Consolas" panose="020B0609020204030204" pitchFamily="49" charset="0"/>
+              </a:rPr>
+              <a:t>rootProject.file</a:t>
+            </a:r>
+            <a:r>
               <a:rPr lang="en-US" sz="1300" dirty="0">
                 <a:solidFill>
                   <a:srgbClr val="000000"/>
                 </a:solidFill>
                 <a:latin typeface="Consolas" panose="020B0609020204030204" pitchFamily="49" charset="0"/>
               </a:rPr>
-              <a:t>       </a:t>
+              <a:t>(</a:t>
+            </a:r>
+            <a:r>
+              <a:rPr lang="en-US" sz="1300" dirty="0">
+                <a:solidFill>
+                  <a:srgbClr val="0000C0"/>
+                </a:solidFill>
+                <a:latin typeface="Consolas" panose="020B0609020204030204" pitchFamily="49" charset="0"/>
+              </a:rPr>
+              <a:t>'</a:t>
             </a:r>
             <a:r>
               <a:rPr lang="en-US" sz="1300" dirty="0" err="1">
                 <a:solidFill>
+                  <a:srgbClr val="0000C0"/>
+                </a:solidFill>
+                <a:latin typeface="Consolas" panose="020B0609020204030204" pitchFamily="49" charset="0"/>
+              </a:rPr>
+              <a:t>com.diffplug.rcpdemo</a:t>
+            </a:r>
+            <a:r>
+              <a:rPr lang="en-US" sz="1300" dirty="0">
+                <a:solidFill>
+                  <a:srgbClr val="0000C0"/>
+                </a:solidFill>
+                <a:latin typeface="Consolas" panose="020B0609020204030204" pitchFamily="49" charset="0"/>
+              </a:rPr>
+              <a:t>'</a:t>
+            </a:r>
+            <a:r>
+              <a:rPr lang="en-US" sz="1300" dirty="0">
+                <a:solidFill>
                   <a:srgbClr val="000000"/>
                 </a:solidFill>
                 <a:latin typeface="Consolas" panose="020B0609020204030204" pitchFamily="49" charset="0"/>
               </a:rPr>
-              <a:t>productPluginDir</a:t>
-            </a:r>
+              <a:t>)</a:t>
+            </a:r>
+          </a:p>
+          <a:p>
             <a:r>
               <a:rPr lang="en-US" sz="1300" dirty="0">
                 <a:solidFill>
@@ -19609,16 +19562,72 @@
                 </a:solidFill>
                 <a:latin typeface="Consolas" panose="020B0609020204030204" pitchFamily="49" charset="0"/>
               </a:rPr>
+              <a:t>        </a:t>
+            </a:r>
+            <a:r>
+              <a:rPr lang="en-US" sz="1300" dirty="0" err="1">
+                <a:solidFill>
+                  <a:srgbClr val="000000"/>
+                </a:solidFill>
+                <a:latin typeface="Consolas" panose="020B0609020204030204" pitchFamily="49" charset="0"/>
+              </a:rPr>
+              <a:t>productFileWithinPlugin</a:t>
+            </a:r>
+            <a:r>
+              <a:rPr lang="en-US" sz="1300" dirty="0">
+                <a:solidFill>
+                  <a:srgbClr val="000000"/>
+                </a:solidFill>
+                <a:latin typeface="Consolas" panose="020B0609020204030204" pitchFamily="49" charset="0"/>
+              </a:rPr>
               <a:t> </a:t>
             </a:r>
             <a:r>
+              <a:rPr lang="en-US" sz="1300" dirty="0">
+                <a:solidFill>
+                  <a:srgbClr val="0000C0"/>
+                </a:solidFill>
+                <a:latin typeface="Consolas" panose="020B0609020204030204" pitchFamily="49" charset="0"/>
+              </a:rPr>
+              <a:t>'</a:t>
+            </a:r>
+            <a:r>
               <a:rPr lang="en-US" sz="1300" dirty="0" err="1">
                 <a:solidFill>
+                  <a:srgbClr val="0000C0"/>
+                </a:solidFill>
+                <a:latin typeface="Consolas" panose="020B0609020204030204" pitchFamily="49" charset="0"/>
+              </a:rPr>
+              <a:t>rcpdemo.product</a:t>
+            </a:r>
+            <a:r>
+              <a:rPr lang="en-US" sz="1300" dirty="0">
+                <a:solidFill>
+                  <a:srgbClr val="0000C0"/>
+                </a:solidFill>
+                <a:latin typeface="Consolas" panose="020B0609020204030204" pitchFamily="49" charset="0"/>
+              </a:rPr>
+              <a:t>'</a:t>
+            </a:r>
+          </a:p>
+          <a:p>
+            <a:r>
+              <a:rPr lang="en-US" sz="1300" dirty="0">
+                <a:solidFill>
                   <a:srgbClr val="000000"/>
                 </a:solidFill>
                 <a:latin typeface="Consolas" panose="020B0609020204030204" pitchFamily="49" charset="0"/>
               </a:rPr>
-              <a:t>rootProject.file</a:t>
+              <a:t>        </a:t>
+            </a:r>
+            <a:r>
+              <a:rPr lang="en-US" sz="1300" dirty="0" err="1">
+                <a:solidFill>
+                  <a:srgbClr val="000000"/>
+                </a:solidFill>
+                <a:latin typeface="Consolas" panose="020B0609020204030204" pitchFamily="49" charset="0"/>
+              </a:rPr>
+              <a:t>explicitVersionPolicy</a:t>
             </a:r>
             <a:r>
               <a:rPr lang="en-US" sz="1300" dirty="0">
@@ -19627,6 +19636,35 @@
                 </a:solidFill>
                 <a:latin typeface="Consolas" panose="020B0609020204030204" pitchFamily="49" charset="0"/>
               </a:rPr>
+              <a:t> {</a:t>
+            </a:r>
+          </a:p>
+          <a:p>
+            <a:r>
+              <a:rPr lang="en-US" sz="1300" dirty="0">
+                <a:solidFill>
+                  <a:srgbClr val="000000"/>
+                </a:solidFill>
+                <a:latin typeface="Consolas" panose="020B0609020204030204" pitchFamily="49" charset="0"/>
+              </a:rPr>
+              <a:t>            </a:t>
+            </a:r>
+            <a:r>
+              <a:rPr lang="en-US" sz="1300" dirty="0" err="1">
+                <a:solidFill>
+                  <a:srgbClr val="000000"/>
+                </a:solidFill>
+                <a:latin typeface="Consolas" panose="020B0609020204030204" pitchFamily="49" charset="0"/>
+              </a:rPr>
+              <a:t>it.resolve</a:t>
+            </a:r>
+            <a:r>
+              <a:rPr lang="en-US" sz="1300" dirty="0">
+                <a:solidFill>
+                  <a:srgbClr val="000000"/>
+                </a:solidFill>
+                <a:latin typeface="Consolas" panose="020B0609020204030204" pitchFamily="49" charset="0"/>
+              </a:rPr>
               <a:t>(</a:t>
             </a:r>
             <a:r>
@@ -19645,7 +19683,7 @@
                 </a:solidFill>
                 <a:latin typeface="Consolas" panose="020B0609020204030204" pitchFamily="49" charset="0"/>
               </a:rPr>
-              <a:t>com.diffplug.rcpdemo</a:t>
+              <a:t>com.google.guava</a:t>
             </a:r>
             <a:r>
               <a:rPr lang="en-US" sz="1300" dirty="0">
@@ -19663,6 +19701,78 @@
                 </a:solidFill>
                 <a:latin typeface="Consolas" panose="020B0609020204030204" pitchFamily="49" charset="0"/>
               </a:rPr>
+              <a:t>, </a:t>
+            </a:r>
+            <a:r>
+              <a:rPr lang="en-US" sz="1300" dirty="0">
+                <a:solidFill>
+                  <a:srgbClr val="0000C0"/>
+                </a:solidFill>
+                <a:latin typeface="Consolas" panose="020B0609020204030204" pitchFamily="49" charset="0"/>
+              </a:rPr>
+              <a:t>'17.0.0'</a:t>
+            </a:r>
+            <a:r>
+              <a:rPr lang="en-US" sz="1300" dirty="0">
+                <a:solidFill>
+                  <a:srgbClr val="000000"/>
+                </a:solidFill>
+                <a:latin typeface="Consolas" panose="020B0609020204030204" pitchFamily="49" charset="0"/>
+              </a:rPr>
+              <a:t>, </a:t>
+            </a:r>
+            <a:r>
+              <a:rPr lang="en-US" sz="1300" dirty="0">
+                <a:solidFill>
+                  <a:srgbClr val="0000C0"/>
+                </a:solidFill>
+                <a:latin typeface="Consolas" panose="020B0609020204030204" pitchFamily="49" charset="0"/>
+              </a:rPr>
+              <a:t>'18.0.0'</a:t>
+            </a:r>
+            <a:r>
+              <a:rPr lang="en-US" sz="1300" dirty="0">
+                <a:solidFill>
+                  <a:srgbClr val="000000"/>
+                </a:solidFill>
+                <a:latin typeface="Consolas" panose="020B0609020204030204" pitchFamily="49" charset="0"/>
+              </a:rPr>
+              <a:t>).with(</a:t>
+            </a:r>
+            <a:r>
+              <a:rPr lang="en-US" sz="1300" dirty="0">
+                <a:solidFill>
+                  <a:srgbClr val="0000C0"/>
+                </a:solidFill>
+                <a:latin typeface="Consolas" panose="020B0609020204030204" pitchFamily="49" charset="0"/>
+              </a:rPr>
+              <a:t>'17.0.0'</a:t>
+            </a:r>
+            <a:r>
+              <a:rPr lang="en-US" sz="1300" dirty="0">
+                <a:solidFill>
+                  <a:srgbClr val="000000"/>
+                </a:solidFill>
+                <a:latin typeface="Consolas" panose="020B0609020204030204" pitchFamily="49" charset="0"/>
+              </a:rPr>
+              <a:t>, </a:t>
+            </a:r>
+            <a:r>
+              <a:rPr lang="en-US" sz="1300" dirty="0">
+                <a:solidFill>
+                  <a:srgbClr val="0000C0"/>
+                </a:solidFill>
+                <a:latin typeface="Consolas" panose="020B0609020204030204" pitchFamily="49" charset="0"/>
+              </a:rPr>
+              <a:t>'18.0.0'</a:t>
+            </a:r>
+            <a:r>
+              <a:rPr lang="en-US" sz="1300" dirty="0">
+                <a:solidFill>
+                  <a:srgbClr val="000000"/>
+                </a:solidFill>
+                <a:latin typeface="Consolas" panose="020B0609020204030204" pitchFamily="49" charset="0"/>
+              </a:rPr>
               <a:t>)</a:t>
             </a:r>
           </a:p>
@@ -19674,8 +19784,10 @@
                 </a:solidFill>
                 <a:latin typeface="Consolas" panose="020B0609020204030204" pitchFamily="49" charset="0"/>
               </a:rPr>
-              <a:t> </a:t>
-            </a:r>
+              <a:t>        }</a:t>
+            </a:r>
+          </a:p>
+          <a:p>
             <a:r>
               <a:rPr lang="en-US" sz="1300" dirty="0">
                 <a:solidFill>
@@ -19683,276 +19795,19 @@
                 </a:solidFill>
                 <a:latin typeface="Consolas" panose="020B0609020204030204" pitchFamily="49" charset="0"/>
               </a:rPr>
-              <a:t>       </a:t>
-            </a:r>
-            <a:r>
-              <a:rPr lang="en-US" sz="1300" dirty="0" err="1">
+              <a:t>    }</a:t>
+            </a:r>
+          </a:p>
+          <a:p>
+            <a:r>
+              <a:rPr lang="en-US" sz="1300" dirty="0">
                 <a:solidFill>
                   <a:srgbClr val="000000"/>
                 </a:solidFill>
                 <a:latin typeface="Consolas" panose="020B0609020204030204" pitchFamily="49" charset="0"/>
               </a:rPr>
-              <a:t>productFileWithinPlugin</a:t>
-            </a:r>
-            <a:r>
-              <a:rPr lang="en-US" sz="1300" dirty="0">
-                <a:solidFill>
-                  <a:srgbClr val="000000"/>
-                </a:solidFill>
-                <a:latin typeface="Consolas" panose="020B0609020204030204" pitchFamily="49" charset="0"/>
-              </a:rPr>
-              <a:t> </a:t>
-            </a:r>
-            <a:r>
-              <a:rPr lang="en-US" sz="1300" dirty="0">
-                <a:solidFill>
-                  <a:srgbClr val="0000C0"/>
-                </a:solidFill>
-                <a:latin typeface="Consolas" panose="020B0609020204030204" pitchFamily="49" charset="0"/>
-              </a:rPr>
-              <a:t>'</a:t>
-            </a:r>
-            <a:r>
-              <a:rPr lang="en-US" sz="1300" dirty="0" err="1">
-                <a:solidFill>
-                  <a:srgbClr val="0000C0"/>
-                </a:solidFill>
-                <a:latin typeface="Consolas" panose="020B0609020204030204" pitchFamily="49" charset="0"/>
-              </a:rPr>
-              <a:t>rcpdemo.product</a:t>
-            </a:r>
-            <a:r>
-              <a:rPr lang="en-US" sz="1300" dirty="0">
-                <a:solidFill>
-                  <a:srgbClr val="0000C0"/>
-                </a:solidFill>
-                <a:latin typeface="Consolas" panose="020B0609020204030204" pitchFamily="49" charset="0"/>
-              </a:rPr>
-              <a:t>'</a:t>
-            </a:r>
-          </a:p>
-          <a:p>
-            <a:r>
-              <a:rPr lang="en-US" sz="1300" dirty="0">
-                <a:solidFill>
-                  <a:srgbClr val="000000"/>
-                </a:solidFill>
-                <a:latin typeface="Consolas" panose="020B0609020204030204" pitchFamily="49" charset="0"/>
-              </a:rPr>
-              <a:t>        </a:t>
-            </a:r>
-            <a:r>
-              <a:rPr lang="en-US" sz="1300" dirty="0" err="1">
-                <a:solidFill>
-                  <a:srgbClr val="000000"/>
-                </a:solidFill>
-                <a:latin typeface="Consolas" panose="020B0609020204030204" pitchFamily="49" charset="0"/>
-              </a:rPr>
-              <a:t>explicitVersionPolicy</a:t>
-            </a:r>
-            <a:r>
-              <a:rPr lang="en-US" sz="1300" dirty="0">
-                <a:solidFill>
-                  <a:srgbClr val="000000"/>
-                </a:solidFill>
-                <a:latin typeface="Consolas" panose="020B0609020204030204" pitchFamily="49" charset="0"/>
-              </a:rPr>
-              <a:t> </a:t>
-            </a:r>
-            <a:r>
-              <a:rPr lang="en-US" sz="1300" dirty="0">
-                <a:solidFill>
-                  <a:srgbClr val="000000"/>
-                </a:solidFill>
-                <a:latin typeface="Consolas" panose="020B0609020204030204" pitchFamily="49" charset="0"/>
-              </a:rPr>
-              <a:t>{</a:t>
-            </a:r>
-          </a:p>
-          <a:p>
-            <a:r>
-              <a:rPr lang="en-US" sz="1300" dirty="0">
-                <a:solidFill>
-                  <a:srgbClr val="000000"/>
-                </a:solidFill>
-                <a:latin typeface="Consolas" panose="020B0609020204030204" pitchFamily="49" charset="0"/>
-              </a:rPr>
-              <a:t>            </a:t>
-            </a:r>
-            <a:r>
-              <a:rPr lang="en-US" sz="1300" dirty="0" err="1">
-                <a:solidFill>
-                  <a:srgbClr val="000000"/>
-                </a:solidFill>
-                <a:latin typeface="Consolas" panose="020B0609020204030204" pitchFamily="49" charset="0"/>
-              </a:rPr>
-              <a:t>it.resolve</a:t>
-            </a:r>
-            <a:r>
-              <a:rPr lang="en-US" sz="1300" dirty="0">
-                <a:solidFill>
-                  <a:srgbClr val="000000"/>
-                </a:solidFill>
-                <a:latin typeface="Consolas" panose="020B0609020204030204" pitchFamily="49" charset="0"/>
-              </a:rPr>
-              <a:t>(</a:t>
-            </a:r>
-            <a:r>
-              <a:rPr lang="en-US" sz="1300" dirty="0">
-                <a:solidFill>
-                  <a:srgbClr val="0000C0"/>
-                </a:solidFill>
-                <a:latin typeface="Consolas" panose="020B0609020204030204" pitchFamily="49" charset="0"/>
-              </a:rPr>
-              <a:t>'</a:t>
-            </a:r>
-            <a:r>
-              <a:rPr lang="en-US" sz="1300" dirty="0" err="1">
-                <a:solidFill>
-                  <a:srgbClr val="0000C0"/>
-                </a:solidFill>
-                <a:latin typeface="Consolas" panose="020B0609020204030204" pitchFamily="49" charset="0"/>
-              </a:rPr>
-              <a:t>com.google.guava</a:t>
-            </a:r>
-            <a:r>
-              <a:rPr lang="en-US" sz="1300" dirty="0">
-                <a:solidFill>
-                  <a:srgbClr val="0000C0"/>
-                </a:solidFill>
-                <a:latin typeface="Consolas" panose="020B0609020204030204" pitchFamily="49" charset="0"/>
-              </a:rPr>
-              <a:t>'</a:t>
-            </a:r>
-            <a:r>
-              <a:rPr lang="en-US" sz="1300" dirty="0">
-                <a:solidFill>
-                  <a:srgbClr val="000000"/>
-                </a:solidFill>
-                <a:latin typeface="Consolas" panose="020B0609020204030204" pitchFamily="49" charset="0"/>
-              </a:rPr>
-              <a:t>, </a:t>
-            </a:r>
-            <a:r>
-              <a:rPr lang="en-US" sz="1300" dirty="0">
-                <a:solidFill>
-                  <a:srgbClr val="0000C0"/>
-                </a:solidFill>
-                <a:latin typeface="Consolas" panose="020B0609020204030204" pitchFamily="49" charset="0"/>
-              </a:rPr>
-              <a:t>'17.0.0'</a:t>
-            </a:r>
-            <a:r>
-              <a:rPr lang="en-US" sz="1300" dirty="0">
-                <a:solidFill>
-                  <a:srgbClr val="000000"/>
-                </a:solidFill>
-                <a:latin typeface="Consolas" panose="020B0609020204030204" pitchFamily="49" charset="0"/>
-              </a:rPr>
-              <a:t>, </a:t>
-            </a:r>
-            <a:r>
-              <a:rPr lang="en-US" sz="1300" dirty="0">
-                <a:solidFill>
-                  <a:srgbClr val="0000C0"/>
-                </a:solidFill>
-                <a:latin typeface="Consolas" panose="020B0609020204030204" pitchFamily="49" charset="0"/>
-              </a:rPr>
-              <a:t>'18.0.0'</a:t>
-            </a:r>
-            <a:r>
-              <a:rPr lang="en-US" sz="1300" dirty="0">
-                <a:solidFill>
-                  <a:srgbClr val="000000"/>
-                </a:solidFill>
-                <a:latin typeface="Consolas" panose="020B0609020204030204" pitchFamily="49" charset="0"/>
-              </a:rPr>
-              <a:t>).with(</a:t>
-            </a:r>
-            <a:r>
-              <a:rPr lang="en-US" sz="1300" dirty="0">
-                <a:solidFill>
-                  <a:srgbClr val="0000C0"/>
-                </a:solidFill>
-                <a:latin typeface="Consolas" panose="020B0609020204030204" pitchFamily="49" charset="0"/>
-              </a:rPr>
-              <a:t>'17.0.0'</a:t>
-            </a:r>
-            <a:r>
-              <a:rPr lang="en-US" sz="1300" dirty="0">
-                <a:solidFill>
-                  <a:srgbClr val="000000"/>
-                </a:solidFill>
-                <a:latin typeface="Consolas" panose="020B0609020204030204" pitchFamily="49" charset="0"/>
-              </a:rPr>
-              <a:t>, </a:t>
-            </a:r>
-            <a:r>
-              <a:rPr lang="en-US" sz="1300" dirty="0">
-                <a:solidFill>
-                  <a:srgbClr val="0000C0"/>
-                </a:solidFill>
-                <a:latin typeface="Consolas" panose="020B0609020204030204" pitchFamily="49" charset="0"/>
-              </a:rPr>
-              <a:t>'18.0.0'</a:t>
-            </a:r>
-            <a:r>
-              <a:rPr lang="en-US" sz="1300" dirty="0">
-                <a:solidFill>
-                  <a:srgbClr val="000000"/>
-                </a:solidFill>
-                <a:latin typeface="Consolas" panose="020B0609020204030204" pitchFamily="49" charset="0"/>
-              </a:rPr>
-              <a:t>)</a:t>
-            </a:r>
-          </a:p>
-          <a:p>
-            <a:r>
-              <a:rPr lang="en-US" sz="1300" dirty="0">
-                <a:solidFill>
-                  <a:srgbClr val="000000"/>
-                </a:solidFill>
-                <a:latin typeface="Consolas" panose="020B0609020204030204" pitchFamily="49" charset="0"/>
-              </a:rPr>
-              <a:t>        }</a:t>
-            </a:r>
-          </a:p>
-          <a:p>
-            <a:r>
-              <a:rPr lang="en-US" sz="1300" dirty="0">
-                <a:solidFill>
-                  <a:srgbClr val="000000"/>
-                </a:solidFill>
-                <a:latin typeface="Consolas" panose="020B0609020204030204" pitchFamily="49" charset="0"/>
-              </a:rPr>
-              <a:t> </a:t>
-            </a:r>
-            <a:r>
-              <a:rPr lang="en-US" sz="1300" dirty="0">
-                <a:solidFill>
-                  <a:srgbClr val="000000"/>
-                </a:solidFill>
-                <a:latin typeface="Consolas" panose="020B0609020204030204" pitchFamily="49" charset="0"/>
-              </a:rPr>
-              <a:t>   }</a:t>
-            </a:r>
-          </a:p>
-          <a:p>
-            <a:r>
-              <a:rPr lang="en-US" sz="1300" dirty="0">
-                <a:solidFill>
-                  <a:srgbClr val="000000"/>
-                </a:solidFill>
-                <a:latin typeface="Consolas" panose="020B0609020204030204" pitchFamily="49" charset="0"/>
-              </a:rPr>
               <a:t>}</a:t>
             </a:r>
-            <a:endParaRPr lang="en-US" sz="1300" dirty="0">
-              <a:solidFill>
-                <a:srgbClr val="000000"/>
-              </a:solidFill>
-              <a:latin typeface="Consolas" panose="020B0609020204030204" pitchFamily="49" charset="0"/>
-            </a:endParaRPr>
           </a:p>
         </p:txBody>
       </p:sp>
@@ -20515,11 +20370,7 @@
           <a:p>
             <a:r>
               <a:rPr lang="en-US" sz="1600" dirty="0"/>
-              <a:t>c</a:t>
-            </a:r>
-            <a:r>
-              <a:rPr lang="en-US" sz="1600" dirty="0"/>
-              <a:t>om.diffplug.needs17</a:t>
+              <a:t>com.diffplug.needs17</a:t>
             </a:r>
           </a:p>
           <a:p>
@@ -20527,7 +20378,6 @@
               <a:rPr lang="en-US" sz="1600" dirty="0"/>
               <a:t>com.diffplug.needs18</a:t>
             </a:r>
-            <a:endParaRPr lang="en-US" sz="1600" dirty="0"/>
           </a:p>
           <a:p>
             <a:r>
@@ -20655,15 +20505,7 @@
             <a:pPr lvl="1"/>
             <a:r>
               <a:rPr lang="en-US" sz="1500" dirty="0"/>
-              <a:t>Creates folder containing all deps from p2, and gives </a:t>
-            </a:r>
-            <a:r>
-              <a:rPr lang="en-US" sz="1500" dirty="0" err="1"/>
-              <a:t>Gradle</a:t>
-            </a:r>
-            <a:r>
-              <a:rPr lang="en-US" sz="1500" dirty="0"/>
-              <a:t> access to the artifacts.</a:t>
+              <a:t>Creates folder containing all deps from p2, and gives Gradle access to the artifacts.</a:t>
             </a:r>
           </a:p>
           <a:p>
@@ -20731,7 +20573,6 @@
               <a:rPr lang="en-US" sz="1500" dirty="0"/>
               <a:t>Creates an IDE containing this entire project.</a:t>
             </a:r>
-            <a:endParaRPr lang="en-US" sz="1500" dirty="0"/>
           </a:p>
           <a:p>
             <a:pPr lvl="1"/>
@@ -22189,12 +22030,8 @@
           <a:lstStyle/>
           <a:p>
             <a:r>
-              <a:rPr lang="en-US" dirty="0" err="1" smtClean="0"/>
-              <a:t>Gradle</a:t>
-            </a:r>
-            <a:r>
               <a:rPr lang="en-US" dirty="0" smtClean="0"/>
-              <a:t> manual is excellent</a:t>
+              <a:t>Gradle manual is excellent</a:t>
             </a:r>
           </a:p>
           <a:p>
@@ -22847,6 +22684,160 @@
 </p:sld>
 </file>
 
+<file path=ppt/slides/slide26.xml><?xml version="1.0" encoding="utf-8"?>
+<p:sld xmlns:a="http://schemas.openxmlformats.org/drawingml/2006/main" xmlns:r="http://schemas.openxmlformats.org/officeDocument/2006/relationships" xmlns:p="http://schemas.openxmlformats.org/presentationml/2006/main">
+  <p:cSld>
+    <p:spTree>
+      <p:nvGrpSpPr>
+        <p:cNvPr id="1" name=""/>
+        <p:cNvGrpSpPr/>
+        <p:nvPr/>
+      </p:nvGrpSpPr>
+      <p:grpSpPr>
+        <a:xfrm>
+          <a:off x="0" y="0"/>
+          <a:ext cx="0" cy="0"/>
+          <a:chOff x="0" y="0"/>
+          <a:chExt cx="0" cy="0"/>
+        </a:xfrm>
+      </p:grpSpPr>
+      <p:sp>
+        <p:nvSpPr>
+          <p:cNvPr id="2" name="Title 1"/>
+          <p:cNvSpPr>
+            <a:spLocks noGrp="1"/>
+          </p:cNvSpPr>
+          <p:nvPr>
+            <p:ph type="ctrTitle"/>
+          </p:nvPr>
+        </p:nvSpPr>
+        <p:spPr>
+          <a:xfrm>
+            <a:off x="1524000" y="111048"/>
+            <a:ext cx="9144000" cy="1880668"/>
+          </a:xfrm>
+        </p:spPr>
+        <p:txBody>
+          <a:bodyPr>
+            <a:normAutofit/>
+          </a:bodyPr>
+          <a:lstStyle/>
+          <a:p>
+            <a:r>
+              <a:rPr lang="en-US" dirty="0" smtClean="0"/>
+              <a:t>Gradle and Eclipse</a:t>
+            </a:r>
+            <a:br>
+              <a:rPr lang="en-US" dirty="0" smtClean="0"/>
+            </a:br>
+            <a:r>
+              <a:rPr lang="en-US" sz="4800" dirty="0" smtClean="0"/>
+              <a:t>IDE as build artifact</a:t>
+            </a:r>
+            <a:endParaRPr lang="en-US" sz="4800" dirty="0"/>
+          </a:p>
+        </p:txBody>
+      </p:sp>
+      <p:pic>
+        <p:nvPicPr>
+          <p:cNvPr id="1026" name="Picture 2" descr="Image result for gradle logo"/>
+          <p:cNvPicPr>
+            <a:picLocks noChangeAspect="1" noChangeArrowheads="1"/>
+          </p:cNvPicPr>
+          <p:nvPr/>
+        </p:nvPicPr>
+        <p:blipFill>
+          <a:blip r:embed="rId3" cstate="print">
+            <a:extLst>
+              <a:ext uri="{28A0092B-C50C-407E-A947-70E740481C1C}">
+                <a14:useLocalDpi xmlns:a14="http://schemas.microsoft.com/office/drawing/2010/main" val="0"/>
+              </a:ext>
+            </a:extLst>
+          </a:blip>
+          <a:srcRect/>
+          <a:stretch>
+            <a:fillRect/>
+          </a:stretch>
+        </p:blipFill>
+        <p:spPr bwMode="auto">
+          <a:xfrm>
+            <a:off x="3404052" y="2043207"/>
+            <a:ext cx="2183495" cy="1735878"/>
+          </a:xfrm>
+          <a:prstGeom prst="rect">
+            <a:avLst/>
+          </a:prstGeom>
+          <a:noFill/>
+          <a:extLst>
+            <a:ext uri="{909E8E84-426E-40DD-AFC4-6F175D3DCCD1}">
+              <a14:hiddenFill xmlns:a14="http://schemas.microsoft.com/office/drawing/2010/main">
+                <a:solidFill>
+                  <a:srgbClr val="FFFFFF"/>
+                </a:solidFill>
+              </a14:hiddenFill>
+            </a:ext>
+          </a:extLst>
+        </p:spPr>
+      </p:pic>
+      <p:pic>
+        <p:nvPicPr>
+          <p:cNvPr id="1028" name="Picture 4" descr="Image result for eclipse logo"/>
+          <p:cNvPicPr>
+            <a:picLocks noChangeAspect="1" noChangeArrowheads="1"/>
+          </p:cNvPicPr>
+          <p:nvPr/>
+        </p:nvPicPr>
+        <p:blipFill rotWithShape="1">
+          <a:blip r:embed="rId4">
+            <a:extLst>
+              <a:ext uri="{28A0092B-C50C-407E-A947-70E740481C1C}">
+                <a14:useLocalDpi xmlns:a14="http://schemas.microsoft.com/office/drawing/2010/main" val="0"/>
+              </a:ext>
+            </a:extLst>
+          </a:blip>
+          <a:srcRect l="23722" t="372" r="23083" b="586"/>
+          <a:stretch/>
+        </p:blipFill>
+        <p:spPr bwMode="auto">
+          <a:xfrm>
+            <a:off x="6797783" y="2070847"/>
+            <a:ext cx="1990165" cy="1945341"/>
+          </a:xfrm>
+          <a:prstGeom prst="rect">
+            <a:avLst/>
+          </a:prstGeom>
+          <a:noFill/>
+          <a:extLst>
+            <a:ext uri="{909E8E84-426E-40DD-AFC4-6F175D3DCCD1}">
+              <a14:hiddenFill xmlns:a14="http://schemas.microsoft.com/office/drawing/2010/main">
+                <a:solidFill>
+                  <a:srgbClr val="FFFFFF"/>
+                </a:solidFill>
+              </a14:hiddenFill>
+            </a:ext>
+          </a:extLst>
+        </p:spPr>
+      </p:pic>
+    </p:spTree>
+    <p:extLst>
+      <p:ext uri="{BB962C8B-B14F-4D97-AF65-F5344CB8AC3E}">
+        <p14:creationId xmlns:p14="http://schemas.microsoft.com/office/powerpoint/2010/main" val="3263427321"/>
+      </p:ext>
+    </p:extLst>
+  </p:cSld>
+  <p:clrMapOvr>
+    <a:masterClrMapping/>
+  </p:clrMapOvr>
+  <p:timing>
+    <p:tnLst>
+      <p:par>
+        <p:cTn id="1" dur="indefinite" restart="never" nodeType="tmRoot"/>
+      </p:par>
+    </p:tnLst>
+  </p:timing>
+</p:sld>
+</file>
+
 <file path=ppt/slides/slide3.xml><?xml version="1.0" encoding="utf-8"?>
 <p:sld xmlns:a="http://schemas.openxmlformats.org/drawingml/2006/main" xmlns:r="http://schemas.openxmlformats.org/officeDocument/2006/relationships" xmlns:p="http://schemas.openxmlformats.org/presentationml/2006/main">
   <p:cSld>
@@ -22880,12 +22871,8 @@
           <a:lstStyle/>
           <a:p>
             <a:r>
-              <a:rPr lang="en-US" dirty="0" err="1" smtClean="0"/>
-              <a:t>Gradle</a:t>
-            </a:r>
-            <a:r>
               <a:rPr lang="en-US" dirty="0" smtClean="0"/>
-              <a:t> vs Maven</a:t>
+              <a:t>Gradle vs Maven</a:t>
             </a:r>
             <a:endParaRPr lang="en-US" dirty="0"/>
           </a:p>
@@ -22943,12 +22930,8 @@
           <a:p>
             <a:pPr lvl="1"/>
             <a:r>
-              <a:rPr lang="en-US" dirty="0" err="1" smtClean="0"/>
-              <a:t>Gradle</a:t>
-            </a:r>
-            <a:r>
               <a:rPr lang="en-US" dirty="0" smtClean="0"/>
-              <a:t> uses a Groovy (or </a:t>
+              <a:t>Gradle uses a Groovy (or </a:t>
             </a:r>
             <a:r>
               <a:rPr lang="en-US" dirty="0" err="1" smtClean="0"/>
@@ -23270,15 +23253,7 @@
           <a:p>
             <a:r>
               <a:rPr lang="en-US" dirty="0" smtClean="0"/>
-              <a:t>Which is </a:t>
-            </a:r>
-            <a:r>
-              <a:rPr lang="en-US" dirty="0" smtClean="0"/>
-              <a:t>most declarative</a:t>
-            </a:r>
-            <a:r>
-              <a:rPr lang="en-US" dirty="0" smtClean="0"/>
-              <a:t>?</a:t>
+              <a:t>Which is most declarative?</a:t>
             </a:r>
             <a:endParaRPr lang="en-US" dirty="0"/>
           </a:p>
@@ -24281,15 +24256,7 @@
           <a:p>
             <a:r>
               <a:rPr lang="en-US" dirty="0" smtClean="0"/>
-              <a:t>Which is </a:t>
-            </a:r>
-            <a:r>
-              <a:rPr lang="en-US" dirty="0" smtClean="0"/>
-              <a:t>most declarative</a:t>
-            </a:r>
-            <a:r>
-              <a:rPr lang="en-US" dirty="0" smtClean="0"/>
-              <a:t>?</a:t>
+              <a:t>Which is most declarative?</a:t>
             </a:r>
             <a:endParaRPr lang="en-US" dirty="0"/>
           </a:p>
@@ -25103,11 +25070,7 @@
           <a:p>
             <a:r>
               <a:rPr lang="en-US" dirty="0" smtClean="0"/>
-              <a:t>Maven vs </a:t>
-            </a:r>
-            <a:r>
-              <a:rPr lang="en-US" dirty="0" err="1" smtClean="0"/>
-              <a:t>Gradle</a:t>
+              <a:t>Maven vs Gradle</a:t>
             </a:r>
             <a:endParaRPr lang="en-US" dirty="0"/>
           </a:p>
@@ -25780,12 +25743,8 @@
           <a:lstStyle/>
           <a:p>
             <a:r>
-              <a:rPr lang="en-US" dirty="0" err="1" smtClean="0"/>
-              <a:t>Gradle</a:t>
-            </a:r>
-            <a:r>
               <a:rPr lang="en-US" dirty="0" smtClean="0"/>
-              <a:t> vs Maven – automating a new thing</a:t>
+              <a:t>Gradle vs Maven – automating a new thing</a:t>
             </a:r>
             <a:endParaRPr lang="en-US" dirty="0"/>
           </a:p>
@@ -25832,12 +25791,8 @@
           <a:p>
             <a:pPr lvl="1"/>
             <a:r>
-              <a:rPr lang="en-US" dirty="0" err="1" smtClean="0"/>
-              <a:t>Gradle</a:t>
-            </a:r>
-            <a:r>
               <a:rPr lang="en-US" dirty="0" smtClean="0"/>
-              <a:t> has an “automation ramp”</a:t>
+              <a:t>Gradle has an “automation ramp”</a:t>
             </a:r>
           </a:p>
           <a:p>
@@ -26536,22 +26491,14 @@
           <a:lstStyle/>
           <a:p>
             <a:r>
-              <a:rPr lang="en-US" dirty="0" err="1" smtClean="0"/>
-              <a:t>Gradle</a:t>
-            </a:r>
-            <a:r>
               <a:rPr lang="en-US" dirty="0" smtClean="0"/>
-              <a:t> vs Maven</a:t>
-            </a:r>
-          </a:p>
-          <a:p>
-            <a:r>
-              <a:rPr lang="en-US" b="1" dirty="0" err="1" smtClean="0"/>
-              <a:t>Gradle</a:t>
-            </a:r>
+              <a:t>Gradle vs Maven</a:t>
+            </a:r>
+          </a:p>
+          <a:p>
             <a:r>
               <a:rPr lang="en-US" b="1" dirty="0" smtClean="0"/>
-              <a:t> as an adoption vector for Eclipse IDE</a:t>
+              <a:t>Gradle as an adoption vector for Eclipse IDE</a:t>
             </a:r>
           </a:p>
           <a:p>
@@ -26564,12 +26511,8 @@
           </a:p>
           <a:p>
             <a:r>
-              <a:rPr lang="en-US" dirty="0" err="1" smtClean="0"/>
-              <a:t>Gradle</a:t>
-            </a:r>
-            <a:r>
               <a:rPr lang="en-US" dirty="0" smtClean="0"/>
-              <a:t> as an adoption vector for Eclipse components (</a:t>
+              <a:t>Gradle as an adoption vector for Eclipse components (</a:t>
             </a:r>
             <a:r>
               <a:rPr lang="en-US" dirty="0" err="1" smtClean="0"/>
@@ -26596,15 +26539,7 @@
             </a:r>
             <a:r>
               <a:rPr lang="en-US" dirty="0"/>
-              <a:t>is p2 hard in </a:t>
-            </a:r>
-            <a:r>
-              <a:rPr lang="en-US" dirty="0" err="1"/>
-              <a:t>Gradle</a:t>
-            </a:r>
-            <a:r>
-              <a:rPr lang="en-US" dirty="0"/>
-              <a:t>?</a:t>
+              <a:t>is p2 hard in Gradle?</a:t>
             </a:r>
           </a:p>
           <a:p>
@@ -26616,12 +26551,8 @@
           </a:p>
           <a:p>
             <a:r>
-              <a:rPr lang="en-US" dirty="0" err="1" smtClean="0"/>
-              <a:t>Gradle</a:t>
-            </a:r>
-            <a:r>
               <a:rPr lang="en-US" dirty="0" smtClean="0"/>
-              <a:t> for Eclipse developers</a:t>
+              <a:t>Gradle for Eclipse developers</a:t>
             </a:r>
           </a:p>
           <a:p>
@@ -26849,15 +26780,7 @@
             <a:pPr lvl="1"/>
             <a:r>
               <a:rPr lang="en-US" dirty="0" smtClean="0"/>
-              <a:t>p</a:t>
-            </a:r>
-            <a:r>
-              <a:rPr lang="en-US" dirty="0" smtClean="0"/>
-              <a:t>2 </a:t>
-            </a:r>
-            <a:r>
-              <a:rPr lang="en-US" dirty="0" smtClean="0"/>
-              <a:t>allows you to install multiple applications which all reference the same pool of </a:t>
+              <a:t>p2 allows you to install multiple applications which all reference the same pool of </a:t>
             </a:r>
             <a:r>
               <a:rPr lang="en-US" dirty="0" err="1" smtClean="0"/>

</xml_diff>